<commit_message>
RA2 Roadmap Update (#849)
* Update k8s-ref-arch-figures.pptx

* k8s roadmap update

* RA2 ch1 - roadmap image added

* RA2 Ch1 - updated roadmap

as per feedback from call on 03/01/20

* RA2 Ch1 - updated roadmap

Additional update

* RA2 Ch1 - roadmap PNG update from PPTX

* Update k8s-ref-arch-figures.pptx
</commit_message>
<xml_diff>
--- a/doc/ref_arch/kubernetes/figures/k8s-ref-arch-figures.pptx
+++ b/doc/ref_arch/kubernetes/figures/k8s-ref-arch-figures.pptx
@@ -113,6 +113,3059 @@
     </p:ext>
   </p:extLst>
 </p:presentation>
+</file>
+
+<file path=ppt/diagrams/colors1.xml><?xml version="1.0" encoding="utf-8"?>
+<dgm:colorsDef xmlns:dgm="http://schemas.openxmlformats.org/drawingml/2006/diagram" xmlns:a="http://schemas.openxmlformats.org/drawingml/2006/main" uniqueId="urn:microsoft.com/office/officeart/2005/8/colors/accent1_2">
+  <dgm:title val=""/>
+  <dgm:desc val=""/>
+  <dgm:catLst>
+    <dgm:cat type="accent1" pri="11200"/>
+  </dgm:catLst>
+  <dgm:styleLbl name="node0">
+    <dgm:fillClrLst meth="repeat">
+      <a:schemeClr val="accent1"/>
+    </dgm:fillClrLst>
+    <dgm:linClrLst meth="repeat">
+      <a:schemeClr val="lt1"/>
+    </dgm:linClrLst>
+    <dgm:effectClrLst/>
+    <dgm:txLinClrLst/>
+    <dgm:txFillClrLst/>
+    <dgm:txEffectClrLst/>
+  </dgm:styleLbl>
+  <dgm:styleLbl name="alignNode1">
+    <dgm:fillClrLst meth="repeat">
+      <a:schemeClr val="accent1"/>
+    </dgm:fillClrLst>
+    <dgm:linClrLst meth="repeat">
+      <a:schemeClr val="accent1"/>
+    </dgm:linClrLst>
+    <dgm:effectClrLst/>
+    <dgm:txLinClrLst/>
+    <dgm:txFillClrLst/>
+    <dgm:txEffectClrLst/>
+  </dgm:styleLbl>
+  <dgm:styleLbl name="node1">
+    <dgm:fillClrLst meth="repeat">
+      <a:schemeClr val="accent1"/>
+    </dgm:fillClrLst>
+    <dgm:linClrLst meth="repeat">
+      <a:schemeClr val="lt1"/>
+    </dgm:linClrLst>
+    <dgm:effectClrLst/>
+    <dgm:txLinClrLst/>
+    <dgm:txFillClrLst/>
+    <dgm:txEffectClrLst/>
+  </dgm:styleLbl>
+  <dgm:styleLbl name="lnNode1">
+    <dgm:fillClrLst meth="repeat">
+      <a:schemeClr val="accent1"/>
+    </dgm:fillClrLst>
+    <dgm:linClrLst meth="repeat">
+      <a:schemeClr val="lt1"/>
+    </dgm:linClrLst>
+    <dgm:effectClrLst/>
+    <dgm:txLinClrLst/>
+    <dgm:txFillClrLst/>
+    <dgm:txEffectClrLst/>
+  </dgm:styleLbl>
+  <dgm:styleLbl name="vennNode1">
+    <dgm:fillClrLst meth="repeat">
+      <a:schemeClr val="accent1">
+        <a:alpha val="50000"/>
+      </a:schemeClr>
+    </dgm:fillClrLst>
+    <dgm:linClrLst meth="repeat">
+      <a:schemeClr val="lt1"/>
+    </dgm:linClrLst>
+    <dgm:effectClrLst/>
+    <dgm:txLinClrLst/>
+    <dgm:txFillClrLst/>
+    <dgm:txEffectClrLst/>
+  </dgm:styleLbl>
+  <dgm:styleLbl name="node2">
+    <dgm:fillClrLst meth="repeat">
+      <a:schemeClr val="accent1"/>
+    </dgm:fillClrLst>
+    <dgm:linClrLst meth="repeat">
+      <a:schemeClr val="lt1"/>
+    </dgm:linClrLst>
+    <dgm:effectClrLst/>
+    <dgm:txLinClrLst/>
+    <dgm:txFillClrLst/>
+    <dgm:txEffectClrLst/>
+  </dgm:styleLbl>
+  <dgm:styleLbl name="node3">
+    <dgm:fillClrLst meth="repeat">
+      <a:schemeClr val="accent1"/>
+    </dgm:fillClrLst>
+    <dgm:linClrLst meth="repeat">
+      <a:schemeClr val="lt1"/>
+    </dgm:linClrLst>
+    <dgm:effectClrLst/>
+    <dgm:txLinClrLst/>
+    <dgm:txFillClrLst/>
+    <dgm:txEffectClrLst/>
+  </dgm:styleLbl>
+  <dgm:styleLbl name="node4">
+    <dgm:fillClrLst meth="repeat">
+      <a:schemeClr val="accent1"/>
+    </dgm:fillClrLst>
+    <dgm:linClrLst meth="repeat">
+      <a:schemeClr val="lt1"/>
+    </dgm:linClrLst>
+    <dgm:effectClrLst/>
+    <dgm:txLinClrLst/>
+    <dgm:txFillClrLst/>
+    <dgm:txEffectClrLst/>
+  </dgm:styleLbl>
+  <dgm:styleLbl name="fgImgPlace1">
+    <dgm:fillClrLst meth="repeat">
+      <a:schemeClr val="accent1">
+        <a:tint val="50000"/>
+      </a:schemeClr>
+    </dgm:fillClrLst>
+    <dgm:linClrLst meth="repeat">
+      <a:schemeClr val="lt1"/>
+    </dgm:linClrLst>
+    <dgm:effectClrLst/>
+    <dgm:txLinClrLst/>
+    <dgm:txFillClrLst meth="repeat">
+      <a:schemeClr val="lt1"/>
+    </dgm:txFillClrLst>
+    <dgm:txEffectClrLst/>
+  </dgm:styleLbl>
+  <dgm:styleLbl name="alignImgPlace1">
+    <dgm:fillClrLst meth="repeat">
+      <a:schemeClr val="accent1">
+        <a:tint val="50000"/>
+      </a:schemeClr>
+    </dgm:fillClrLst>
+    <dgm:linClrLst meth="repeat">
+      <a:schemeClr val="lt1"/>
+    </dgm:linClrLst>
+    <dgm:effectClrLst/>
+    <dgm:txLinClrLst/>
+    <dgm:txFillClrLst meth="repeat">
+      <a:schemeClr val="lt1"/>
+    </dgm:txFillClrLst>
+    <dgm:txEffectClrLst/>
+  </dgm:styleLbl>
+  <dgm:styleLbl name="bgImgPlace1">
+    <dgm:fillClrLst meth="repeat">
+      <a:schemeClr val="accent1">
+        <a:tint val="50000"/>
+      </a:schemeClr>
+    </dgm:fillClrLst>
+    <dgm:linClrLst meth="repeat">
+      <a:schemeClr val="lt1"/>
+    </dgm:linClrLst>
+    <dgm:effectClrLst/>
+    <dgm:txLinClrLst/>
+    <dgm:txFillClrLst meth="repeat">
+      <a:schemeClr val="lt1"/>
+    </dgm:txFillClrLst>
+    <dgm:txEffectClrLst/>
+  </dgm:styleLbl>
+  <dgm:styleLbl name="sibTrans2D1">
+    <dgm:fillClrLst meth="repeat">
+      <a:schemeClr val="accent1">
+        <a:tint val="60000"/>
+      </a:schemeClr>
+    </dgm:fillClrLst>
+    <dgm:linClrLst meth="repeat">
+      <a:schemeClr val="accent1">
+        <a:tint val="60000"/>
+      </a:schemeClr>
+    </dgm:linClrLst>
+    <dgm:effectClrLst/>
+    <dgm:txLinClrLst/>
+    <dgm:txFillClrLst/>
+    <dgm:txEffectClrLst/>
+  </dgm:styleLbl>
+  <dgm:styleLbl name="fgSibTrans2D1">
+    <dgm:fillClrLst meth="repeat">
+      <a:schemeClr val="accent1">
+        <a:tint val="60000"/>
+      </a:schemeClr>
+    </dgm:fillClrLst>
+    <dgm:linClrLst meth="repeat">
+      <a:schemeClr val="accent1">
+        <a:tint val="60000"/>
+      </a:schemeClr>
+    </dgm:linClrLst>
+    <dgm:effectClrLst/>
+    <dgm:txLinClrLst/>
+    <dgm:txFillClrLst/>
+    <dgm:txEffectClrLst/>
+  </dgm:styleLbl>
+  <dgm:styleLbl name="bgSibTrans2D1">
+    <dgm:fillClrLst meth="repeat">
+      <a:schemeClr val="accent1">
+        <a:tint val="60000"/>
+      </a:schemeClr>
+    </dgm:fillClrLst>
+    <dgm:linClrLst meth="repeat">
+      <a:schemeClr val="accent1">
+        <a:tint val="60000"/>
+      </a:schemeClr>
+    </dgm:linClrLst>
+    <dgm:effectClrLst/>
+    <dgm:txLinClrLst/>
+    <dgm:txFillClrLst/>
+    <dgm:txEffectClrLst/>
+  </dgm:styleLbl>
+  <dgm:styleLbl name="sibTrans1D1">
+    <dgm:fillClrLst meth="repeat">
+      <a:schemeClr val="accent1"/>
+    </dgm:fillClrLst>
+    <dgm:linClrLst meth="repeat">
+      <a:schemeClr val="accent1"/>
+    </dgm:linClrLst>
+    <dgm:effectClrLst/>
+    <dgm:txLinClrLst/>
+    <dgm:txFillClrLst meth="repeat">
+      <a:schemeClr val="tx1"/>
+    </dgm:txFillClrLst>
+    <dgm:txEffectClrLst/>
+  </dgm:styleLbl>
+  <dgm:styleLbl name="callout">
+    <dgm:fillClrLst meth="repeat">
+      <a:schemeClr val="accent1"/>
+    </dgm:fillClrLst>
+    <dgm:linClrLst meth="repeat">
+      <a:schemeClr val="accent1">
+        <a:tint val="50000"/>
+      </a:schemeClr>
+    </dgm:linClrLst>
+    <dgm:effectClrLst/>
+    <dgm:txLinClrLst/>
+    <dgm:txFillClrLst meth="repeat">
+      <a:schemeClr val="tx1"/>
+    </dgm:txFillClrLst>
+    <dgm:txEffectClrLst/>
+  </dgm:styleLbl>
+  <dgm:styleLbl name="asst0">
+    <dgm:fillClrLst meth="repeat">
+      <a:schemeClr val="accent1"/>
+    </dgm:fillClrLst>
+    <dgm:linClrLst meth="repeat">
+      <a:schemeClr val="lt1"/>
+    </dgm:linClrLst>
+    <dgm:effectClrLst/>
+    <dgm:txLinClrLst/>
+    <dgm:txFillClrLst/>
+    <dgm:txEffectClrLst/>
+  </dgm:styleLbl>
+  <dgm:styleLbl name="asst1">
+    <dgm:fillClrLst meth="repeat">
+      <a:schemeClr val="accent1"/>
+    </dgm:fillClrLst>
+    <dgm:linClrLst meth="repeat">
+      <a:schemeClr val="lt1"/>
+    </dgm:linClrLst>
+    <dgm:effectClrLst/>
+    <dgm:txLinClrLst/>
+    <dgm:txFillClrLst/>
+    <dgm:txEffectClrLst/>
+  </dgm:styleLbl>
+  <dgm:styleLbl name="asst2">
+    <dgm:fillClrLst meth="repeat">
+      <a:schemeClr val="accent1"/>
+    </dgm:fillClrLst>
+    <dgm:linClrLst meth="repeat">
+      <a:schemeClr val="lt1"/>
+    </dgm:linClrLst>
+    <dgm:effectClrLst/>
+    <dgm:txLinClrLst/>
+    <dgm:txFillClrLst/>
+    <dgm:txEffectClrLst/>
+  </dgm:styleLbl>
+  <dgm:styleLbl name="asst3">
+    <dgm:fillClrLst meth="repeat">
+      <a:schemeClr val="accent1"/>
+    </dgm:fillClrLst>
+    <dgm:linClrLst meth="repeat">
+      <a:schemeClr val="lt1"/>
+    </dgm:linClrLst>
+    <dgm:effectClrLst/>
+    <dgm:txLinClrLst/>
+    <dgm:txFillClrLst/>
+    <dgm:txEffectClrLst/>
+  </dgm:styleLbl>
+  <dgm:styleLbl name="asst4">
+    <dgm:fillClrLst meth="repeat">
+      <a:schemeClr val="accent1"/>
+    </dgm:fillClrLst>
+    <dgm:linClrLst meth="repeat">
+      <a:schemeClr val="lt1"/>
+    </dgm:linClrLst>
+    <dgm:effectClrLst/>
+    <dgm:txLinClrLst/>
+    <dgm:txFillClrLst/>
+    <dgm:txEffectClrLst/>
+  </dgm:styleLbl>
+  <dgm:styleLbl name="parChTrans2D1">
+    <dgm:fillClrLst meth="repeat">
+      <a:schemeClr val="accent1">
+        <a:tint val="60000"/>
+      </a:schemeClr>
+    </dgm:fillClrLst>
+    <dgm:linClrLst meth="repeat">
+      <a:schemeClr val="accent1">
+        <a:tint val="60000"/>
+      </a:schemeClr>
+    </dgm:linClrLst>
+    <dgm:effectClrLst/>
+    <dgm:txLinClrLst/>
+    <dgm:txFillClrLst meth="repeat">
+      <a:schemeClr val="lt1"/>
+    </dgm:txFillClrLst>
+    <dgm:txEffectClrLst/>
+  </dgm:styleLbl>
+  <dgm:styleLbl name="parChTrans2D2">
+    <dgm:fillClrLst meth="repeat">
+      <a:schemeClr val="accent1"/>
+    </dgm:fillClrLst>
+    <dgm:linClrLst meth="repeat">
+      <a:schemeClr val="accent1"/>
+    </dgm:linClrLst>
+    <dgm:effectClrLst/>
+    <dgm:txLinClrLst/>
+    <dgm:txFillClrLst meth="repeat">
+      <a:schemeClr val="lt1"/>
+    </dgm:txFillClrLst>
+    <dgm:txEffectClrLst/>
+  </dgm:styleLbl>
+  <dgm:styleLbl name="parChTrans2D3">
+    <dgm:fillClrLst meth="repeat">
+      <a:schemeClr val="accent1"/>
+    </dgm:fillClrLst>
+    <dgm:linClrLst meth="repeat">
+      <a:schemeClr val="accent1"/>
+    </dgm:linClrLst>
+    <dgm:effectClrLst/>
+    <dgm:txLinClrLst/>
+    <dgm:txFillClrLst meth="repeat">
+      <a:schemeClr val="lt1"/>
+    </dgm:txFillClrLst>
+    <dgm:txEffectClrLst/>
+  </dgm:styleLbl>
+  <dgm:styleLbl name="parChTrans2D4">
+    <dgm:fillClrLst meth="repeat">
+      <a:schemeClr val="accent1"/>
+    </dgm:fillClrLst>
+    <dgm:linClrLst meth="repeat">
+      <a:schemeClr val="accent1"/>
+    </dgm:linClrLst>
+    <dgm:effectClrLst/>
+    <dgm:txLinClrLst/>
+    <dgm:txFillClrLst meth="repeat">
+      <a:schemeClr val="lt1"/>
+    </dgm:txFillClrLst>
+    <dgm:txEffectClrLst/>
+  </dgm:styleLbl>
+  <dgm:styleLbl name="parChTrans1D1">
+    <dgm:fillClrLst meth="repeat">
+      <a:schemeClr val="accent1"/>
+    </dgm:fillClrLst>
+    <dgm:linClrLst meth="repeat">
+      <a:schemeClr val="accent1">
+        <a:shade val="60000"/>
+      </a:schemeClr>
+    </dgm:linClrLst>
+    <dgm:effectClrLst/>
+    <dgm:txLinClrLst/>
+    <dgm:txFillClrLst meth="repeat">
+      <a:schemeClr val="tx1"/>
+    </dgm:txFillClrLst>
+    <dgm:txEffectClrLst/>
+  </dgm:styleLbl>
+  <dgm:styleLbl name="parChTrans1D2">
+    <dgm:fillClrLst meth="repeat">
+      <a:schemeClr val="accent1"/>
+    </dgm:fillClrLst>
+    <dgm:linClrLst meth="repeat">
+      <a:schemeClr val="accent1">
+        <a:shade val="60000"/>
+      </a:schemeClr>
+    </dgm:linClrLst>
+    <dgm:effectClrLst/>
+    <dgm:txLinClrLst/>
+    <dgm:txFillClrLst meth="repeat">
+      <a:schemeClr val="tx1"/>
+    </dgm:txFillClrLst>
+    <dgm:txEffectClrLst/>
+  </dgm:styleLbl>
+  <dgm:styleLbl name="parChTrans1D3">
+    <dgm:fillClrLst meth="repeat">
+      <a:schemeClr val="accent1"/>
+    </dgm:fillClrLst>
+    <dgm:linClrLst meth="repeat">
+      <a:schemeClr val="accent1">
+        <a:shade val="80000"/>
+      </a:schemeClr>
+    </dgm:linClrLst>
+    <dgm:effectClrLst/>
+    <dgm:txLinClrLst/>
+    <dgm:txFillClrLst meth="repeat">
+      <a:schemeClr val="tx1"/>
+    </dgm:txFillClrLst>
+    <dgm:txEffectClrLst/>
+  </dgm:styleLbl>
+  <dgm:styleLbl name="parChTrans1D4">
+    <dgm:fillClrLst meth="repeat">
+      <a:schemeClr val="accent1"/>
+    </dgm:fillClrLst>
+    <dgm:linClrLst meth="repeat">
+      <a:schemeClr val="accent1">
+        <a:shade val="80000"/>
+      </a:schemeClr>
+    </dgm:linClrLst>
+    <dgm:effectClrLst/>
+    <dgm:txLinClrLst/>
+    <dgm:txFillClrLst meth="repeat">
+      <a:schemeClr val="tx1"/>
+    </dgm:txFillClrLst>
+    <dgm:txEffectClrLst/>
+  </dgm:styleLbl>
+  <dgm:styleLbl name="fgAcc1">
+    <dgm:fillClrLst meth="repeat">
+      <a:schemeClr val="lt1">
+        <a:alpha val="90000"/>
+      </a:schemeClr>
+    </dgm:fillClrLst>
+    <dgm:linClrLst meth="repeat">
+      <a:schemeClr val="accent1"/>
+    </dgm:linClrLst>
+    <dgm:effectClrLst/>
+    <dgm:txLinClrLst/>
+    <dgm:txFillClrLst meth="repeat">
+      <a:schemeClr val="dk1"/>
+    </dgm:txFillClrLst>
+    <dgm:txEffectClrLst/>
+  </dgm:styleLbl>
+  <dgm:styleLbl name="conFgAcc1">
+    <dgm:fillClrLst meth="repeat">
+      <a:schemeClr val="lt1">
+        <a:alpha val="90000"/>
+      </a:schemeClr>
+    </dgm:fillClrLst>
+    <dgm:linClrLst meth="repeat">
+      <a:schemeClr val="accent1"/>
+    </dgm:linClrLst>
+    <dgm:effectClrLst/>
+    <dgm:txLinClrLst/>
+    <dgm:txFillClrLst meth="repeat">
+      <a:schemeClr val="dk1"/>
+    </dgm:txFillClrLst>
+    <dgm:txEffectClrLst/>
+  </dgm:styleLbl>
+  <dgm:styleLbl name="alignAcc1">
+    <dgm:fillClrLst meth="repeat">
+      <a:schemeClr val="lt1">
+        <a:alpha val="90000"/>
+      </a:schemeClr>
+    </dgm:fillClrLst>
+    <dgm:linClrLst meth="repeat">
+      <a:schemeClr val="accent1"/>
+    </dgm:linClrLst>
+    <dgm:effectClrLst/>
+    <dgm:txLinClrLst/>
+    <dgm:txFillClrLst meth="repeat">
+      <a:schemeClr val="dk1"/>
+    </dgm:txFillClrLst>
+    <dgm:txEffectClrLst/>
+  </dgm:styleLbl>
+  <dgm:styleLbl name="trAlignAcc1">
+    <dgm:fillClrLst meth="repeat">
+      <a:schemeClr val="lt1">
+        <a:alpha val="40000"/>
+      </a:schemeClr>
+    </dgm:fillClrLst>
+    <dgm:linClrLst meth="repeat">
+      <a:schemeClr val="accent1"/>
+    </dgm:linClrLst>
+    <dgm:effectClrLst/>
+    <dgm:txLinClrLst/>
+    <dgm:txFillClrLst meth="repeat">
+      <a:schemeClr val="dk1"/>
+    </dgm:txFillClrLst>
+    <dgm:txEffectClrLst/>
+  </dgm:styleLbl>
+  <dgm:styleLbl name="bgAcc1">
+    <dgm:fillClrLst meth="repeat">
+      <a:schemeClr val="lt1">
+        <a:alpha val="90000"/>
+      </a:schemeClr>
+    </dgm:fillClrLst>
+    <dgm:linClrLst meth="repeat">
+      <a:schemeClr val="accent1"/>
+    </dgm:linClrLst>
+    <dgm:effectClrLst/>
+    <dgm:txLinClrLst/>
+    <dgm:txFillClrLst meth="repeat">
+      <a:schemeClr val="dk1"/>
+    </dgm:txFillClrLst>
+    <dgm:txEffectClrLst/>
+  </dgm:styleLbl>
+  <dgm:styleLbl name="solidFgAcc1">
+    <dgm:fillClrLst meth="repeat">
+      <a:schemeClr val="lt1"/>
+    </dgm:fillClrLst>
+    <dgm:linClrLst meth="repeat">
+      <a:schemeClr val="accent1"/>
+    </dgm:linClrLst>
+    <dgm:effectClrLst/>
+    <dgm:txLinClrLst/>
+    <dgm:txFillClrLst meth="repeat">
+      <a:schemeClr val="dk1"/>
+    </dgm:txFillClrLst>
+    <dgm:txEffectClrLst/>
+  </dgm:styleLbl>
+  <dgm:styleLbl name="solidAlignAcc1">
+    <dgm:fillClrLst meth="repeat">
+      <a:schemeClr val="lt1"/>
+    </dgm:fillClrLst>
+    <dgm:linClrLst meth="repeat">
+      <a:schemeClr val="accent1"/>
+    </dgm:linClrLst>
+    <dgm:effectClrLst/>
+    <dgm:txLinClrLst/>
+    <dgm:txFillClrLst meth="repeat">
+      <a:schemeClr val="dk1"/>
+    </dgm:txFillClrLst>
+    <dgm:txEffectClrLst/>
+  </dgm:styleLbl>
+  <dgm:styleLbl name="solidBgAcc1">
+    <dgm:fillClrLst meth="repeat">
+      <a:schemeClr val="lt1"/>
+    </dgm:fillClrLst>
+    <dgm:linClrLst meth="repeat">
+      <a:schemeClr val="accent1"/>
+    </dgm:linClrLst>
+    <dgm:effectClrLst/>
+    <dgm:txLinClrLst/>
+    <dgm:txFillClrLst meth="repeat">
+      <a:schemeClr val="dk1"/>
+    </dgm:txFillClrLst>
+    <dgm:txEffectClrLst/>
+  </dgm:styleLbl>
+  <dgm:styleLbl name="fgAccFollowNode1">
+    <dgm:fillClrLst meth="repeat">
+      <a:schemeClr val="accent1">
+        <a:alpha val="90000"/>
+        <a:tint val="40000"/>
+      </a:schemeClr>
+    </dgm:fillClrLst>
+    <dgm:linClrLst meth="repeat">
+      <a:schemeClr val="accent1">
+        <a:alpha val="90000"/>
+        <a:tint val="40000"/>
+      </a:schemeClr>
+    </dgm:linClrLst>
+    <dgm:effectClrLst/>
+    <dgm:txLinClrLst/>
+    <dgm:txFillClrLst meth="repeat">
+      <a:schemeClr val="dk1"/>
+    </dgm:txFillClrLst>
+    <dgm:txEffectClrLst/>
+  </dgm:styleLbl>
+  <dgm:styleLbl name="alignAccFollowNode1">
+    <dgm:fillClrLst meth="repeat">
+      <a:schemeClr val="accent1">
+        <a:alpha val="90000"/>
+        <a:tint val="40000"/>
+      </a:schemeClr>
+    </dgm:fillClrLst>
+    <dgm:linClrLst meth="repeat">
+      <a:schemeClr val="accent1">
+        <a:alpha val="90000"/>
+        <a:tint val="40000"/>
+      </a:schemeClr>
+    </dgm:linClrLst>
+    <dgm:effectClrLst/>
+    <dgm:txLinClrLst/>
+    <dgm:txFillClrLst meth="repeat">
+      <a:schemeClr val="dk1"/>
+    </dgm:txFillClrLst>
+    <dgm:txEffectClrLst/>
+  </dgm:styleLbl>
+  <dgm:styleLbl name="bgAccFollowNode1">
+    <dgm:fillClrLst meth="repeat">
+      <a:schemeClr val="accent1">
+        <a:alpha val="90000"/>
+        <a:tint val="40000"/>
+      </a:schemeClr>
+    </dgm:fillClrLst>
+    <dgm:linClrLst meth="repeat">
+      <a:schemeClr val="accent1">
+        <a:alpha val="90000"/>
+        <a:tint val="40000"/>
+      </a:schemeClr>
+    </dgm:linClrLst>
+    <dgm:effectClrLst/>
+    <dgm:txLinClrLst/>
+    <dgm:txFillClrLst meth="repeat">
+      <a:schemeClr val="dk1"/>
+    </dgm:txFillClrLst>
+    <dgm:txEffectClrLst/>
+  </dgm:styleLbl>
+  <dgm:styleLbl name="fgAcc0">
+    <dgm:fillClrLst meth="repeat">
+      <a:schemeClr val="lt1">
+        <a:alpha val="90000"/>
+      </a:schemeClr>
+    </dgm:fillClrLst>
+    <dgm:linClrLst meth="repeat">
+      <a:schemeClr val="accent1"/>
+    </dgm:linClrLst>
+    <dgm:effectClrLst/>
+    <dgm:txLinClrLst/>
+    <dgm:txFillClrLst meth="repeat">
+      <a:schemeClr val="dk1"/>
+    </dgm:txFillClrLst>
+    <dgm:txEffectClrLst/>
+  </dgm:styleLbl>
+  <dgm:styleLbl name="fgAcc2">
+    <dgm:fillClrLst meth="repeat">
+      <a:schemeClr val="lt1">
+        <a:alpha val="90000"/>
+      </a:schemeClr>
+    </dgm:fillClrLst>
+    <dgm:linClrLst meth="repeat">
+      <a:schemeClr val="accent1"/>
+    </dgm:linClrLst>
+    <dgm:effectClrLst/>
+    <dgm:txLinClrLst/>
+    <dgm:txFillClrLst meth="repeat">
+      <a:schemeClr val="dk1"/>
+    </dgm:txFillClrLst>
+    <dgm:txEffectClrLst/>
+  </dgm:styleLbl>
+  <dgm:styleLbl name="fgAcc3">
+    <dgm:fillClrLst meth="repeat">
+      <a:schemeClr val="lt1">
+        <a:alpha val="90000"/>
+      </a:schemeClr>
+    </dgm:fillClrLst>
+    <dgm:linClrLst meth="repeat">
+      <a:schemeClr val="accent1"/>
+    </dgm:linClrLst>
+    <dgm:effectClrLst/>
+    <dgm:txLinClrLst/>
+    <dgm:txFillClrLst meth="repeat">
+      <a:schemeClr val="dk1"/>
+    </dgm:txFillClrLst>
+    <dgm:txEffectClrLst/>
+  </dgm:styleLbl>
+  <dgm:styleLbl name="fgAcc4">
+    <dgm:fillClrLst meth="repeat">
+      <a:schemeClr val="lt1">
+        <a:alpha val="90000"/>
+      </a:schemeClr>
+    </dgm:fillClrLst>
+    <dgm:linClrLst meth="repeat">
+      <a:schemeClr val="accent1"/>
+    </dgm:linClrLst>
+    <dgm:effectClrLst/>
+    <dgm:txLinClrLst/>
+    <dgm:txFillClrLst meth="repeat">
+      <a:schemeClr val="dk1"/>
+    </dgm:txFillClrLst>
+    <dgm:txEffectClrLst/>
+  </dgm:styleLbl>
+  <dgm:styleLbl name="bgShp">
+    <dgm:fillClrLst meth="repeat">
+      <a:schemeClr val="accent1">
+        <a:tint val="40000"/>
+      </a:schemeClr>
+    </dgm:fillClrLst>
+    <dgm:linClrLst meth="repeat">
+      <a:schemeClr val="accent1"/>
+    </dgm:linClrLst>
+    <dgm:effectClrLst/>
+    <dgm:txLinClrLst/>
+    <dgm:txFillClrLst meth="repeat">
+      <a:schemeClr val="dk1"/>
+    </dgm:txFillClrLst>
+    <dgm:txEffectClrLst/>
+  </dgm:styleLbl>
+  <dgm:styleLbl name="dkBgShp">
+    <dgm:fillClrLst meth="repeat">
+      <a:schemeClr val="accent1">
+        <a:shade val="80000"/>
+      </a:schemeClr>
+    </dgm:fillClrLst>
+    <dgm:linClrLst meth="repeat">
+      <a:schemeClr val="accent1"/>
+    </dgm:linClrLst>
+    <dgm:effectClrLst/>
+    <dgm:txLinClrLst/>
+    <dgm:txFillClrLst meth="repeat">
+      <a:schemeClr val="lt1"/>
+    </dgm:txFillClrLst>
+    <dgm:txEffectClrLst/>
+  </dgm:styleLbl>
+  <dgm:styleLbl name="trBgShp">
+    <dgm:fillClrLst meth="repeat">
+      <a:schemeClr val="accent1">
+        <a:tint val="50000"/>
+        <a:alpha val="40000"/>
+      </a:schemeClr>
+    </dgm:fillClrLst>
+    <dgm:linClrLst meth="repeat">
+      <a:schemeClr val="accent1"/>
+    </dgm:linClrLst>
+    <dgm:effectClrLst/>
+    <dgm:txLinClrLst/>
+    <dgm:txFillClrLst meth="repeat">
+      <a:schemeClr val="lt1"/>
+    </dgm:txFillClrLst>
+    <dgm:txEffectClrLst/>
+  </dgm:styleLbl>
+  <dgm:styleLbl name="fgShp">
+    <dgm:fillClrLst meth="repeat">
+      <a:schemeClr val="accent1">
+        <a:tint val="60000"/>
+      </a:schemeClr>
+    </dgm:fillClrLst>
+    <dgm:linClrLst meth="repeat">
+      <a:schemeClr val="lt1"/>
+    </dgm:linClrLst>
+    <dgm:effectClrLst/>
+    <dgm:txLinClrLst/>
+    <dgm:txFillClrLst meth="repeat">
+      <a:schemeClr val="dk1"/>
+    </dgm:txFillClrLst>
+    <dgm:txEffectClrLst/>
+  </dgm:styleLbl>
+  <dgm:styleLbl name="revTx">
+    <dgm:fillClrLst meth="repeat">
+      <a:schemeClr val="lt1">
+        <a:alpha val="0"/>
+      </a:schemeClr>
+    </dgm:fillClrLst>
+    <dgm:linClrLst meth="repeat">
+      <a:schemeClr val="dk1">
+        <a:alpha val="0"/>
+      </a:schemeClr>
+    </dgm:linClrLst>
+    <dgm:effectClrLst/>
+    <dgm:txLinClrLst/>
+    <dgm:txFillClrLst meth="repeat">
+      <a:schemeClr val="tx1"/>
+    </dgm:txFillClrLst>
+    <dgm:txEffectClrLst/>
+  </dgm:styleLbl>
+</dgm:colorsDef>
+</file>
+
+<file path=ppt/diagrams/data1.xml><?xml version="1.0" encoding="utf-8"?>
+<dgm:dataModel xmlns:dgm="http://schemas.openxmlformats.org/drawingml/2006/diagram" xmlns:a="http://schemas.openxmlformats.org/drawingml/2006/main">
+  <dgm:ptLst>
+    <dgm:pt modelId="{A35D7A88-9133-694F-B399-45807959694F}" type="doc">
+      <dgm:prSet loTypeId="urn:microsoft.com/office/officeart/2005/8/layout/hList1" loCatId="" qsTypeId="urn:microsoft.com/office/officeart/2005/8/quickstyle/simple1" qsCatId="simple" csTypeId="urn:microsoft.com/office/officeart/2005/8/colors/accent1_2" csCatId="accent1" phldr="1"/>
+      <dgm:spPr/>
+      <dgm:t>
+        <a:bodyPr/>
+        <a:lstStyle/>
+        <a:p>
+          <a:endParaRPr lang="en-GB"/>
+        </a:p>
+      </dgm:t>
+    </dgm:pt>
+    <dgm:pt modelId="{F6071E1C-EDAC-9A40-920E-6396D1F3F8B6}">
+      <dgm:prSet phldrT="[Text]"/>
+      <dgm:spPr/>
+      <dgm:t>
+        <a:bodyPr/>
+        <a:lstStyle/>
+        <a:p>
+          <a:r>
+            <a:rPr lang="en-GB" dirty="0" err="1"/>
+            <a:t>Snezka</a:t>
+          </a:r>
+          <a:r>
+            <a:rPr lang="en-GB" dirty="0"/>
+            <a:t> Release</a:t>
+          </a:r>
+          <a:br>
+            <a:rPr lang="en-GB" dirty="0"/>
+          </a:br>
+          <a:r>
+            <a:rPr lang="en-GB" dirty="0"/>
+            <a:t>January 2020</a:t>
+          </a:r>
+        </a:p>
+      </dgm:t>
+    </dgm:pt>
+    <dgm:pt modelId="{B11FCE09-F120-8B49-AA5E-D514E812025E}" type="parTrans" cxnId="{C05F9B6C-1B06-1D4C-929B-E1475DEFCA56}">
+      <dgm:prSet/>
+      <dgm:spPr/>
+      <dgm:t>
+        <a:bodyPr/>
+        <a:lstStyle/>
+        <a:p>
+          <a:endParaRPr lang="en-GB"/>
+        </a:p>
+      </dgm:t>
+    </dgm:pt>
+    <dgm:pt modelId="{14358919-DA4D-1D41-A664-4A9CD28B0FE9}" type="sibTrans" cxnId="{C05F9B6C-1B06-1D4C-929B-E1475DEFCA56}">
+      <dgm:prSet/>
+      <dgm:spPr/>
+      <dgm:t>
+        <a:bodyPr/>
+        <a:lstStyle/>
+        <a:p>
+          <a:endParaRPr lang="en-GB"/>
+        </a:p>
+      </dgm:t>
+    </dgm:pt>
+    <dgm:pt modelId="{77355CEE-F4FB-B145-BA7B-0969D50CE212}">
+      <dgm:prSet phldrT="[Text]"/>
+      <dgm:spPr/>
+      <dgm:t>
+        <a:bodyPr/>
+        <a:lstStyle/>
+        <a:p>
+          <a:r>
+            <a:rPr lang="en-GB" dirty="0"/>
+            <a:t>Table of Contents complete for all chapters</a:t>
+          </a:r>
+        </a:p>
+      </dgm:t>
+    </dgm:pt>
+    <dgm:pt modelId="{F2BDCC11-56D3-4442-A429-5D06472DF069}" type="parTrans" cxnId="{8592FE85-E4E9-8B48-A407-6DADD09EA5B1}">
+      <dgm:prSet/>
+      <dgm:spPr/>
+      <dgm:t>
+        <a:bodyPr/>
+        <a:lstStyle/>
+        <a:p>
+          <a:endParaRPr lang="en-GB"/>
+        </a:p>
+      </dgm:t>
+    </dgm:pt>
+    <dgm:pt modelId="{E6C3A3F3-286E-1A48-A36D-BD1179C07AFF}" type="sibTrans" cxnId="{8592FE85-E4E9-8B48-A407-6DADD09EA5B1}">
+      <dgm:prSet/>
+      <dgm:spPr/>
+      <dgm:t>
+        <a:bodyPr/>
+        <a:lstStyle/>
+        <a:p>
+          <a:endParaRPr lang="en-GB"/>
+        </a:p>
+      </dgm:t>
+    </dgm:pt>
+    <dgm:pt modelId="{E29E2A27-8533-E24F-8C31-5B9521B1439F}">
+      <dgm:prSet phldrT="[Text]"/>
+      <dgm:spPr/>
+      <dgm:t>
+        <a:bodyPr/>
+        <a:lstStyle/>
+        <a:p>
+          <a:r>
+            <a:rPr lang="en-GB" dirty="0"/>
+            <a:t>TBC Release </a:t>
+          </a:r>
+          <a:br>
+            <a:rPr lang="en-GB" dirty="0"/>
+          </a:br>
+          <a:r>
+            <a:rPr lang="en-GB" dirty="0"/>
+            <a:t>April 2020</a:t>
+          </a:r>
+        </a:p>
+      </dgm:t>
+    </dgm:pt>
+    <dgm:pt modelId="{9F65CE4E-3F27-574B-8BF9-5777868BAB69}" type="parTrans" cxnId="{9094B106-AE32-1F4B-AAC1-A6787A1B5D54}">
+      <dgm:prSet/>
+      <dgm:spPr/>
+      <dgm:t>
+        <a:bodyPr/>
+        <a:lstStyle/>
+        <a:p>
+          <a:endParaRPr lang="en-GB"/>
+        </a:p>
+      </dgm:t>
+    </dgm:pt>
+    <dgm:pt modelId="{8EEB82E9-666C-3146-88B9-7686E6360F82}" type="sibTrans" cxnId="{9094B106-AE32-1F4B-AAC1-A6787A1B5D54}">
+      <dgm:prSet/>
+      <dgm:spPr/>
+      <dgm:t>
+        <a:bodyPr/>
+        <a:lstStyle/>
+        <a:p>
+          <a:endParaRPr lang="en-GB"/>
+        </a:p>
+      </dgm:t>
+    </dgm:pt>
+    <dgm:pt modelId="{A42F1D9D-E815-A840-B21A-C8A308A1B242}">
+      <dgm:prSet phldrT="[Text]"/>
+      <dgm:spPr/>
+      <dgm:t>
+        <a:bodyPr/>
+        <a:lstStyle/>
+        <a:p>
+          <a:r>
+            <a:rPr lang="en-GB" dirty="0"/>
+            <a:t>Chapter 2 (Requirements) at “Complete”</a:t>
+          </a:r>
+        </a:p>
+      </dgm:t>
+    </dgm:pt>
+    <dgm:pt modelId="{10F67730-0A55-0E47-B0C8-495B065B6AAE}" type="parTrans" cxnId="{0989B610-916F-E94B-B537-014828527B9D}">
+      <dgm:prSet/>
+      <dgm:spPr/>
+      <dgm:t>
+        <a:bodyPr/>
+        <a:lstStyle/>
+        <a:p>
+          <a:endParaRPr lang="en-GB"/>
+        </a:p>
+      </dgm:t>
+    </dgm:pt>
+    <dgm:pt modelId="{59DC6480-6842-1E42-AD02-3E23098B1587}" type="sibTrans" cxnId="{0989B610-916F-E94B-B537-014828527B9D}">
+      <dgm:prSet/>
+      <dgm:spPr/>
+      <dgm:t>
+        <a:bodyPr/>
+        <a:lstStyle/>
+        <a:p>
+          <a:endParaRPr lang="en-GB"/>
+        </a:p>
+      </dgm:t>
+    </dgm:pt>
+    <dgm:pt modelId="{38B9CEC9-CE5B-5C4B-BB14-05AD30CEFB16}">
+      <dgm:prSet phldrT="[Text]"/>
+      <dgm:spPr/>
+      <dgm:t>
+        <a:bodyPr/>
+        <a:lstStyle/>
+        <a:p>
+          <a:r>
+            <a:rPr lang="en-GB" dirty="0"/>
+            <a:t>TBC Release</a:t>
+          </a:r>
+          <a:br>
+            <a:rPr lang="en-GB" dirty="0"/>
+          </a:br>
+          <a:r>
+            <a:rPr lang="en-GB" dirty="0"/>
+            <a:t>July 2020</a:t>
+          </a:r>
+        </a:p>
+      </dgm:t>
+    </dgm:pt>
+    <dgm:pt modelId="{960ABDB2-224B-2E47-9C3A-81C29589C852}" type="parTrans" cxnId="{B3330C26-D38A-304F-9698-5A710021FFA5}">
+      <dgm:prSet/>
+      <dgm:spPr/>
+      <dgm:t>
+        <a:bodyPr/>
+        <a:lstStyle/>
+        <a:p>
+          <a:endParaRPr lang="en-GB"/>
+        </a:p>
+      </dgm:t>
+    </dgm:pt>
+    <dgm:pt modelId="{92693703-2B0C-9D43-AB0A-839797ADE0B9}" type="sibTrans" cxnId="{B3330C26-D38A-304F-9698-5A710021FFA5}">
+      <dgm:prSet/>
+      <dgm:spPr/>
+      <dgm:t>
+        <a:bodyPr/>
+        <a:lstStyle/>
+        <a:p>
+          <a:endParaRPr lang="en-GB"/>
+        </a:p>
+      </dgm:t>
+    </dgm:pt>
+    <dgm:pt modelId="{8DDEE7E0-DDB7-A24B-89B2-ADACF1815350}">
+      <dgm:prSet phldrT="[Text]"/>
+      <dgm:spPr/>
+      <dgm:t>
+        <a:bodyPr/>
+        <a:lstStyle/>
+        <a:p>
+          <a:r>
+            <a:rPr lang="en-GB" dirty="0"/>
+            <a:t>Include VM orchestration for CNFs</a:t>
+          </a:r>
+        </a:p>
+      </dgm:t>
+    </dgm:pt>
+    <dgm:pt modelId="{4B5C4B37-5F9D-864F-A390-04545835A47D}" type="parTrans" cxnId="{7380BC42-2D37-E747-B2C4-31F0A7DF3963}">
+      <dgm:prSet/>
+      <dgm:spPr/>
+      <dgm:t>
+        <a:bodyPr/>
+        <a:lstStyle/>
+        <a:p>
+          <a:endParaRPr lang="en-GB"/>
+        </a:p>
+      </dgm:t>
+    </dgm:pt>
+    <dgm:pt modelId="{4EF6A7EA-1061-834F-976A-042DFFF32111}" type="sibTrans" cxnId="{7380BC42-2D37-E747-B2C4-31F0A7DF3963}">
+      <dgm:prSet/>
+      <dgm:spPr/>
+      <dgm:t>
+        <a:bodyPr/>
+        <a:lstStyle/>
+        <a:p>
+          <a:endParaRPr lang="en-GB"/>
+        </a:p>
+      </dgm:t>
+    </dgm:pt>
+    <dgm:pt modelId="{8E9C75FF-DB25-164E-A506-DC6D3BD6B9F9}">
+      <dgm:prSet phldrT="[Text]"/>
+      <dgm:spPr/>
+      <dgm:t>
+        <a:bodyPr/>
+        <a:lstStyle/>
+        <a:p>
+          <a:r>
+            <a:rPr lang="en-GB" dirty="0"/>
+            <a:t>Chapters 1,2,3,6 at “Lots of SME feedback” or better</a:t>
+          </a:r>
+        </a:p>
+      </dgm:t>
+    </dgm:pt>
+    <dgm:pt modelId="{D5534814-DD98-9B4A-969A-C516DAF4A0C6}" type="parTrans" cxnId="{9822DB2E-1A45-EA43-873A-798EFDFAAFEA}">
+      <dgm:prSet/>
+      <dgm:spPr/>
+      <dgm:t>
+        <a:bodyPr/>
+        <a:lstStyle/>
+        <a:p>
+          <a:endParaRPr lang="en-GB"/>
+        </a:p>
+      </dgm:t>
+    </dgm:pt>
+    <dgm:pt modelId="{13CA365F-E908-194F-9A99-1F8B0D6C17A9}" type="sibTrans" cxnId="{9822DB2E-1A45-EA43-873A-798EFDFAAFEA}">
+      <dgm:prSet/>
+      <dgm:spPr/>
+      <dgm:t>
+        <a:bodyPr/>
+        <a:lstStyle/>
+        <a:p>
+          <a:endParaRPr lang="en-GB"/>
+        </a:p>
+      </dgm:t>
+    </dgm:pt>
+    <dgm:pt modelId="{502ABEF5-7782-A741-AC6F-58A53F775AD3}">
+      <dgm:prSet phldrT="[Text]"/>
+      <dgm:spPr/>
+      <dgm:t>
+        <a:bodyPr/>
+        <a:lstStyle/>
+        <a:p>
+          <a:r>
+            <a:rPr lang="en-GB" dirty="0"/>
+            <a:t>All other chapters at "Lots of SME feedback" or better</a:t>
+          </a:r>
+        </a:p>
+      </dgm:t>
+    </dgm:pt>
+    <dgm:pt modelId="{DA8B308B-E247-944E-A621-8150EA718556}" type="parTrans" cxnId="{73ED9D5A-F09B-9C4C-A07D-46CD25618CEC}">
+      <dgm:prSet/>
+      <dgm:spPr/>
+      <dgm:t>
+        <a:bodyPr/>
+        <a:lstStyle/>
+        <a:p>
+          <a:endParaRPr lang="en-GB"/>
+        </a:p>
+      </dgm:t>
+    </dgm:pt>
+    <dgm:pt modelId="{0FEE11B4-2D90-4C42-98E1-D9EEEC68621C}" type="sibTrans" cxnId="{73ED9D5A-F09B-9C4C-A07D-46CD25618CEC}">
+      <dgm:prSet/>
+      <dgm:spPr/>
+      <dgm:t>
+        <a:bodyPr/>
+        <a:lstStyle/>
+        <a:p>
+          <a:endParaRPr lang="en-GB"/>
+        </a:p>
+      </dgm:t>
+    </dgm:pt>
+    <dgm:pt modelId="{32345713-D1E2-DD45-A7D5-1E0B73484EB3}">
+      <dgm:prSet phldrT="[Text]"/>
+      <dgm:spPr/>
+      <dgm:t>
+        <a:bodyPr/>
+        <a:lstStyle/>
+        <a:p>
+          <a:r>
+            <a:rPr lang="en-GB" dirty="0"/>
+            <a:t>Mapping of specification to RM Infrastructure Profiles included</a:t>
+          </a:r>
+        </a:p>
+      </dgm:t>
+    </dgm:pt>
+    <dgm:pt modelId="{909F91E8-758A-C547-B85A-B4180D0C532C}" type="parTrans" cxnId="{DA260700-17CE-B94B-AA6B-C95F311CD4E4}">
+      <dgm:prSet/>
+      <dgm:spPr/>
+      <dgm:t>
+        <a:bodyPr/>
+        <a:lstStyle/>
+        <a:p>
+          <a:endParaRPr lang="en-GB"/>
+        </a:p>
+      </dgm:t>
+    </dgm:pt>
+    <dgm:pt modelId="{AAF2275B-5EBD-9641-A7E0-915F5BD29C6F}" type="sibTrans" cxnId="{DA260700-17CE-B94B-AA6B-C95F311CD4E4}">
+      <dgm:prSet/>
+      <dgm:spPr/>
+      <dgm:t>
+        <a:bodyPr/>
+        <a:lstStyle/>
+        <a:p>
+          <a:endParaRPr lang="en-GB"/>
+        </a:p>
+      </dgm:t>
+    </dgm:pt>
+    <dgm:pt modelId="{23FA0D5C-0197-2944-A5C8-19189213DB5B}" type="pres">
+      <dgm:prSet presAssocID="{A35D7A88-9133-694F-B399-45807959694F}" presName="Name0" presStyleCnt="0">
+        <dgm:presLayoutVars>
+          <dgm:dir/>
+          <dgm:animLvl val="lvl"/>
+          <dgm:resizeHandles val="exact"/>
+        </dgm:presLayoutVars>
+      </dgm:prSet>
+      <dgm:spPr/>
+    </dgm:pt>
+    <dgm:pt modelId="{1A22594E-C8FB-D94B-9096-0583C20536F3}" type="pres">
+      <dgm:prSet presAssocID="{F6071E1C-EDAC-9A40-920E-6396D1F3F8B6}" presName="composite" presStyleCnt="0"/>
+      <dgm:spPr/>
+    </dgm:pt>
+    <dgm:pt modelId="{8E556C75-6679-644B-807C-21BB2C474F56}" type="pres">
+      <dgm:prSet presAssocID="{F6071E1C-EDAC-9A40-920E-6396D1F3F8B6}" presName="parTx" presStyleLbl="alignNode1" presStyleIdx="0" presStyleCnt="3">
+        <dgm:presLayoutVars>
+          <dgm:chMax val="0"/>
+          <dgm:chPref val="0"/>
+          <dgm:bulletEnabled val="1"/>
+        </dgm:presLayoutVars>
+      </dgm:prSet>
+      <dgm:spPr/>
+    </dgm:pt>
+    <dgm:pt modelId="{A924A376-1AFF-B249-A073-BE4BC22C232A}" type="pres">
+      <dgm:prSet presAssocID="{F6071E1C-EDAC-9A40-920E-6396D1F3F8B6}" presName="desTx" presStyleLbl="alignAccFollowNode1" presStyleIdx="0" presStyleCnt="3">
+        <dgm:presLayoutVars>
+          <dgm:bulletEnabled val="1"/>
+        </dgm:presLayoutVars>
+      </dgm:prSet>
+      <dgm:spPr/>
+    </dgm:pt>
+    <dgm:pt modelId="{AB1B2BDC-4FAB-AB48-B2CB-9A5C458985E4}" type="pres">
+      <dgm:prSet presAssocID="{14358919-DA4D-1D41-A664-4A9CD28B0FE9}" presName="space" presStyleCnt="0"/>
+      <dgm:spPr/>
+    </dgm:pt>
+    <dgm:pt modelId="{875E6A7F-0A9A-0B42-988C-D4EFC4D15B45}" type="pres">
+      <dgm:prSet presAssocID="{E29E2A27-8533-E24F-8C31-5B9521B1439F}" presName="composite" presStyleCnt="0"/>
+      <dgm:spPr/>
+    </dgm:pt>
+    <dgm:pt modelId="{73CC7069-E204-0A47-9A88-7F587A301723}" type="pres">
+      <dgm:prSet presAssocID="{E29E2A27-8533-E24F-8C31-5B9521B1439F}" presName="parTx" presStyleLbl="alignNode1" presStyleIdx="1" presStyleCnt="3">
+        <dgm:presLayoutVars>
+          <dgm:chMax val="0"/>
+          <dgm:chPref val="0"/>
+          <dgm:bulletEnabled val="1"/>
+        </dgm:presLayoutVars>
+      </dgm:prSet>
+      <dgm:spPr/>
+    </dgm:pt>
+    <dgm:pt modelId="{1707C938-BFB5-BC42-8771-DAEA58EA8DA8}" type="pres">
+      <dgm:prSet presAssocID="{E29E2A27-8533-E24F-8C31-5B9521B1439F}" presName="desTx" presStyleLbl="alignAccFollowNode1" presStyleIdx="1" presStyleCnt="3">
+        <dgm:presLayoutVars>
+          <dgm:bulletEnabled val="1"/>
+        </dgm:presLayoutVars>
+      </dgm:prSet>
+      <dgm:spPr/>
+    </dgm:pt>
+    <dgm:pt modelId="{91CD1BBC-0D9F-0A4A-8220-7D20667F9911}" type="pres">
+      <dgm:prSet presAssocID="{8EEB82E9-666C-3146-88B9-7686E6360F82}" presName="space" presStyleCnt="0"/>
+      <dgm:spPr/>
+    </dgm:pt>
+    <dgm:pt modelId="{EF55E5B8-77A4-3E45-B9EB-1177CAFFA2CF}" type="pres">
+      <dgm:prSet presAssocID="{38B9CEC9-CE5B-5C4B-BB14-05AD30CEFB16}" presName="composite" presStyleCnt="0"/>
+      <dgm:spPr/>
+    </dgm:pt>
+    <dgm:pt modelId="{60720EE3-9CC1-1242-B5CD-82C76E3DFCF1}" type="pres">
+      <dgm:prSet presAssocID="{38B9CEC9-CE5B-5C4B-BB14-05AD30CEFB16}" presName="parTx" presStyleLbl="alignNode1" presStyleIdx="2" presStyleCnt="3">
+        <dgm:presLayoutVars>
+          <dgm:chMax val="0"/>
+          <dgm:chPref val="0"/>
+          <dgm:bulletEnabled val="1"/>
+        </dgm:presLayoutVars>
+      </dgm:prSet>
+      <dgm:spPr/>
+    </dgm:pt>
+    <dgm:pt modelId="{FB02936D-9138-E541-868F-238A92445032}" type="pres">
+      <dgm:prSet presAssocID="{38B9CEC9-CE5B-5C4B-BB14-05AD30CEFB16}" presName="desTx" presStyleLbl="alignAccFollowNode1" presStyleIdx="2" presStyleCnt="3">
+        <dgm:presLayoutVars>
+          <dgm:bulletEnabled val="1"/>
+        </dgm:presLayoutVars>
+      </dgm:prSet>
+      <dgm:spPr/>
+    </dgm:pt>
+  </dgm:ptLst>
+  <dgm:cxnLst>
+    <dgm:cxn modelId="{DA260700-17CE-B94B-AA6B-C95F311CD4E4}" srcId="{38B9CEC9-CE5B-5C4B-BB14-05AD30CEFB16}" destId="{32345713-D1E2-DD45-A7D5-1E0B73484EB3}" srcOrd="1" destOrd="0" parTransId="{909F91E8-758A-C547-B85A-B4180D0C532C}" sibTransId="{AAF2275B-5EBD-9641-A7E0-915F5BD29C6F}"/>
+    <dgm:cxn modelId="{9094B106-AE32-1F4B-AAC1-A6787A1B5D54}" srcId="{A35D7A88-9133-694F-B399-45807959694F}" destId="{E29E2A27-8533-E24F-8C31-5B9521B1439F}" srcOrd="1" destOrd="0" parTransId="{9F65CE4E-3F27-574B-8BF9-5777868BAB69}" sibTransId="{8EEB82E9-666C-3146-88B9-7686E6360F82}"/>
+    <dgm:cxn modelId="{0989B610-916F-E94B-B537-014828527B9D}" srcId="{E29E2A27-8533-E24F-8C31-5B9521B1439F}" destId="{A42F1D9D-E815-A840-B21A-C8A308A1B242}" srcOrd="0" destOrd="0" parTransId="{10F67730-0A55-0E47-B0C8-495B065B6AAE}" sibTransId="{59DC6480-6842-1E42-AD02-3E23098B1587}"/>
+    <dgm:cxn modelId="{AF100C21-C138-BB4F-A0B0-B583DA2BCD9A}" type="presOf" srcId="{502ABEF5-7782-A741-AC6F-58A53F775AD3}" destId="{1707C938-BFB5-BC42-8771-DAEA58EA8DA8}" srcOrd="0" destOrd="1" presId="urn:microsoft.com/office/officeart/2005/8/layout/hList1"/>
+    <dgm:cxn modelId="{B3330C26-D38A-304F-9698-5A710021FFA5}" srcId="{A35D7A88-9133-694F-B399-45807959694F}" destId="{38B9CEC9-CE5B-5C4B-BB14-05AD30CEFB16}" srcOrd="2" destOrd="0" parTransId="{960ABDB2-224B-2E47-9C3A-81C29589C852}" sibTransId="{92693703-2B0C-9D43-AB0A-839797ADE0B9}"/>
+    <dgm:cxn modelId="{FD8EA629-7407-DE4E-9D11-2F61E5BDA84F}" type="presOf" srcId="{38B9CEC9-CE5B-5C4B-BB14-05AD30CEFB16}" destId="{60720EE3-9CC1-1242-B5CD-82C76E3DFCF1}" srcOrd="0" destOrd="0" presId="urn:microsoft.com/office/officeart/2005/8/layout/hList1"/>
+    <dgm:cxn modelId="{9822DB2E-1A45-EA43-873A-798EFDFAAFEA}" srcId="{F6071E1C-EDAC-9A40-920E-6396D1F3F8B6}" destId="{8E9C75FF-DB25-164E-A506-DC6D3BD6B9F9}" srcOrd="1" destOrd="0" parTransId="{D5534814-DD98-9B4A-969A-C516DAF4A0C6}" sibTransId="{13CA365F-E908-194F-9A99-1F8B0D6C17A9}"/>
+    <dgm:cxn modelId="{7D568038-554A-1942-9671-9E17579025B6}" type="presOf" srcId="{8DDEE7E0-DDB7-A24B-89B2-ADACF1815350}" destId="{FB02936D-9138-E541-868F-238A92445032}" srcOrd="0" destOrd="0" presId="urn:microsoft.com/office/officeart/2005/8/layout/hList1"/>
+    <dgm:cxn modelId="{9C9CA33B-94FA-944E-8B82-BCE120CA75FC}" type="presOf" srcId="{A42F1D9D-E815-A840-B21A-C8A308A1B242}" destId="{1707C938-BFB5-BC42-8771-DAEA58EA8DA8}" srcOrd="0" destOrd="0" presId="urn:microsoft.com/office/officeart/2005/8/layout/hList1"/>
+    <dgm:cxn modelId="{7380BC42-2D37-E747-B2C4-31F0A7DF3963}" srcId="{38B9CEC9-CE5B-5C4B-BB14-05AD30CEFB16}" destId="{8DDEE7E0-DDB7-A24B-89B2-ADACF1815350}" srcOrd="0" destOrd="0" parTransId="{4B5C4B37-5F9D-864F-A390-04545835A47D}" sibTransId="{4EF6A7EA-1061-834F-976A-042DFFF32111}"/>
+    <dgm:cxn modelId="{73ED9D5A-F09B-9C4C-A07D-46CD25618CEC}" srcId="{E29E2A27-8533-E24F-8C31-5B9521B1439F}" destId="{502ABEF5-7782-A741-AC6F-58A53F775AD3}" srcOrd="1" destOrd="0" parTransId="{DA8B308B-E247-944E-A621-8150EA718556}" sibTransId="{0FEE11B4-2D90-4C42-98E1-D9EEEC68621C}"/>
+    <dgm:cxn modelId="{C05F9B6C-1B06-1D4C-929B-E1475DEFCA56}" srcId="{A35D7A88-9133-694F-B399-45807959694F}" destId="{F6071E1C-EDAC-9A40-920E-6396D1F3F8B6}" srcOrd="0" destOrd="0" parTransId="{B11FCE09-F120-8B49-AA5E-D514E812025E}" sibTransId="{14358919-DA4D-1D41-A664-4A9CD28B0FE9}"/>
+    <dgm:cxn modelId="{990DE37D-6CEE-8349-BF60-7F61A7416952}" type="presOf" srcId="{32345713-D1E2-DD45-A7D5-1E0B73484EB3}" destId="{FB02936D-9138-E541-868F-238A92445032}" srcOrd="0" destOrd="1" presId="urn:microsoft.com/office/officeart/2005/8/layout/hList1"/>
+    <dgm:cxn modelId="{8592FE85-E4E9-8B48-A407-6DADD09EA5B1}" srcId="{F6071E1C-EDAC-9A40-920E-6396D1F3F8B6}" destId="{77355CEE-F4FB-B145-BA7B-0969D50CE212}" srcOrd="0" destOrd="0" parTransId="{F2BDCC11-56D3-4442-A429-5D06472DF069}" sibTransId="{E6C3A3F3-286E-1A48-A36D-BD1179C07AFF}"/>
+    <dgm:cxn modelId="{8C36C4AB-1953-C244-91AE-167DEB852B08}" type="presOf" srcId="{8E9C75FF-DB25-164E-A506-DC6D3BD6B9F9}" destId="{A924A376-1AFF-B249-A073-BE4BC22C232A}" srcOrd="0" destOrd="1" presId="urn:microsoft.com/office/officeart/2005/8/layout/hList1"/>
+    <dgm:cxn modelId="{25D9F6AB-861C-FB4A-88B4-6A7084DC8BD9}" type="presOf" srcId="{77355CEE-F4FB-B145-BA7B-0969D50CE212}" destId="{A924A376-1AFF-B249-A073-BE4BC22C232A}" srcOrd="0" destOrd="0" presId="urn:microsoft.com/office/officeart/2005/8/layout/hList1"/>
+    <dgm:cxn modelId="{37900FAC-31E5-D040-B661-19590CFA8636}" type="presOf" srcId="{A35D7A88-9133-694F-B399-45807959694F}" destId="{23FA0D5C-0197-2944-A5C8-19189213DB5B}" srcOrd="0" destOrd="0" presId="urn:microsoft.com/office/officeart/2005/8/layout/hList1"/>
+    <dgm:cxn modelId="{8B3BE7C1-8C12-644A-ADCE-FC0DC4A865DA}" type="presOf" srcId="{E29E2A27-8533-E24F-8C31-5B9521B1439F}" destId="{73CC7069-E204-0A47-9A88-7F587A301723}" srcOrd="0" destOrd="0" presId="urn:microsoft.com/office/officeart/2005/8/layout/hList1"/>
+    <dgm:cxn modelId="{E488FCC3-DA08-2A42-A8FF-B2EC61CF377E}" type="presOf" srcId="{F6071E1C-EDAC-9A40-920E-6396D1F3F8B6}" destId="{8E556C75-6679-644B-807C-21BB2C474F56}" srcOrd="0" destOrd="0" presId="urn:microsoft.com/office/officeart/2005/8/layout/hList1"/>
+    <dgm:cxn modelId="{0E430635-6EB8-0549-9DAE-EB2F11183DED}" type="presParOf" srcId="{23FA0D5C-0197-2944-A5C8-19189213DB5B}" destId="{1A22594E-C8FB-D94B-9096-0583C20536F3}" srcOrd="0" destOrd="0" presId="urn:microsoft.com/office/officeart/2005/8/layout/hList1"/>
+    <dgm:cxn modelId="{58A6B990-4382-5A40-93CC-6162412AAC65}" type="presParOf" srcId="{1A22594E-C8FB-D94B-9096-0583C20536F3}" destId="{8E556C75-6679-644B-807C-21BB2C474F56}" srcOrd="0" destOrd="0" presId="urn:microsoft.com/office/officeart/2005/8/layout/hList1"/>
+    <dgm:cxn modelId="{D2089C64-1DCD-D449-9AF6-517645BDD7D2}" type="presParOf" srcId="{1A22594E-C8FB-D94B-9096-0583C20536F3}" destId="{A924A376-1AFF-B249-A073-BE4BC22C232A}" srcOrd="1" destOrd="0" presId="urn:microsoft.com/office/officeart/2005/8/layout/hList1"/>
+    <dgm:cxn modelId="{0B867FAC-C0A1-0147-B03A-DABA6E436540}" type="presParOf" srcId="{23FA0D5C-0197-2944-A5C8-19189213DB5B}" destId="{AB1B2BDC-4FAB-AB48-B2CB-9A5C458985E4}" srcOrd="1" destOrd="0" presId="urn:microsoft.com/office/officeart/2005/8/layout/hList1"/>
+    <dgm:cxn modelId="{EF66201B-D35A-CB40-B823-C0D0F5B65893}" type="presParOf" srcId="{23FA0D5C-0197-2944-A5C8-19189213DB5B}" destId="{875E6A7F-0A9A-0B42-988C-D4EFC4D15B45}" srcOrd="2" destOrd="0" presId="urn:microsoft.com/office/officeart/2005/8/layout/hList1"/>
+    <dgm:cxn modelId="{521A9494-455E-6644-8D6C-ED62F342FA27}" type="presParOf" srcId="{875E6A7F-0A9A-0B42-988C-D4EFC4D15B45}" destId="{73CC7069-E204-0A47-9A88-7F587A301723}" srcOrd="0" destOrd="0" presId="urn:microsoft.com/office/officeart/2005/8/layout/hList1"/>
+    <dgm:cxn modelId="{4A94898F-B1AB-CA4E-82BA-5CA61A6E0650}" type="presParOf" srcId="{875E6A7F-0A9A-0B42-988C-D4EFC4D15B45}" destId="{1707C938-BFB5-BC42-8771-DAEA58EA8DA8}" srcOrd="1" destOrd="0" presId="urn:microsoft.com/office/officeart/2005/8/layout/hList1"/>
+    <dgm:cxn modelId="{84E5D496-E1A8-9441-AFFB-B095721E22B1}" type="presParOf" srcId="{23FA0D5C-0197-2944-A5C8-19189213DB5B}" destId="{91CD1BBC-0D9F-0A4A-8220-7D20667F9911}" srcOrd="3" destOrd="0" presId="urn:microsoft.com/office/officeart/2005/8/layout/hList1"/>
+    <dgm:cxn modelId="{1D5A5C35-493C-DD4C-8673-35E4EFC34D2C}" type="presParOf" srcId="{23FA0D5C-0197-2944-A5C8-19189213DB5B}" destId="{EF55E5B8-77A4-3E45-B9EB-1177CAFFA2CF}" srcOrd="4" destOrd="0" presId="urn:microsoft.com/office/officeart/2005/8/layout/hList1"/>
+    <dgm:cxn modelId="{6A6806CF-43D5-D94B-9544-A0CF0126565E}" type="presParOf" srcId="{EF55E5B8-77A4-3E45-B9EB-1177CAFFA2CF}" destId="{60720EE3-9CC1-1242-B5CD-82C76E3DFCF1}" srcOrd="0" destOrd="0" presId="urn:microsoft.com/office/officeart/2005/8/layout/hList1"/>
+    <dgm:cxn modelId="{B87AE40E-7836-9B4D-B6EA-188C2562B5ED}" type="presParOf" srcId="{EF55E5B8-77A4-3E45-B9EB-1177CAFFA2CF}" destId="{FB02936D-9138-E541-868F-238A92445032}" srcOrd="1" destOrd="0" presId="urn:microsoft.com/office/officeart/2005/8/layout/hList1"/>
+  </dgm:cxnLst>
+  <dgm:bg/>
+  <dgm:whole/>
+  <dgm:extLst>
+    <a:ext uri="http://schemas.microsoft.com/office/drawing/2008/diagram">
+      <dsp:dataModelExt xmlns:dsp="http://schemas.microsoft.com/office/drawing/2008/diagram" relId="rId6" minVer="http://schemas.openxmlformats.org/drawingml/2006/diagram"/>
+    </a:ext>
+  </dgm:extLst>
+</dgm:dataModel>
+</file>
+
+<file path=ppt/diagrams/drawing1.xml><?xml version="1.0" encoding="utf-8"?>
+<dsp:drawing xmlns:dgm="http://schemas.openxmlformats.org/drawingml/2006/diagram" xmlns:dsp="http://schemas.microsoft.com/office/drawing/2008/diagram" xmlns:a="http://schemas.openxmlformats.org/drawingml/2006/main">
+  <dsp:spTree>
+    <dsp:nvGrpSpPr>
+      <dsp:cNvPr id="0" name=""/>
+      <dsp:cNvGrpSpPr/>
+    </dsp:nvGrpSpPr>
+    <dsp:grpSpPr/>
+    <dsp:sp modelId="{8E556C75-6679-644B-807C-21BB2C474F56}">
+      <dsp:nvSpPr>
+        <dsp:cNvPr id="0" name=""/>
+        <dsp:cNvSpPr/>
+      </dsp:nvSpPr>
+      <dsp:spPr>
+        <a:xfrm>
+          <a:off x="5434" y="64105"/>
+          <a:ext cx="5298406" cy="1568760"/>
+        </a:xfrm>
+        <a:prstGeom prst="rect">
+          <a:avLst/>
+        </a:prstGeom>
+        <a:solidFill>
+          <a:schemeClr val="accent1">
+            <a:hueOff val="0"/>
+            <a:satOff val="0"/>
+            <a:lumOff val="0"/>
+            <a:alphaOff val="0"/>
+          </a:schemeClr>
+        </a:solidFill>
+        <a:ln w="12700" cap="flat" cmpd="sng" algn="ctr">
+          <a:solidFill>
+            <a:schemeClr val="accent1">
+              <a:hueOff val="0"/>
+              <a:satOff val="0"/>
+              <a:lumOff val="0"/>
+              <a:alphaOff val="0"/>
+            </a:schemeClr>
+          </a:solidFill>
+          <a:prstDash val="solid"/>
+          <a:miter lim="800000"/>
+        </a:ln>
+        <a:effectLst/>
+      </dsp:spPr>
+      <dsp:style>
+        <a:lnRef idx="2">
+          <a:scrgbClr r="0" g="0" b="0"/>
+        </a:lnRef>
+        <a:fillRef idx="1">
+          <a:scrgbClr r="0" g="0" b="0"/>
+        </a:fillRef>
+        <a:effectRef idx="0">
+          <a:scrgbClr r="0" g="0" b="0"/>
+        </a:effectRef>
+        <a:fontRef idx="minor">
+          <a:schemeClr val="lt1"/>
+        </a:fontRef>
+      </dsp:style>
+      <dsp:txBody>
+        <a:bodyPr spcFirstLastPara="0" vert="horz" wrap="square" lIns="305816" tIns="174752" rIns="305816" bIns="174752" numCol="1" spcCol="1270" anchor="ctr" anchorCtr="0">
+          <a:noAutofit/>
+        </a:bodyPr>
+        <a:lstStyle/>
+        <a:p>
+          <a:pPr marL="0" lvl="0" indent="0" algn="ctr" defTabSz="1911350">
+            <a:lnSpc>
+              <a:spcPct val="90000"/>
+            </a:lnSpc>
+            <a:spcBef>
+              <a:spcPct val="0"/>
+            </a:spcBef>
+            <a:spcAft>
+              <a:spcPct val="35000"/>
+            </a:spcAft>
+            <a:buNone/>
+          </a:pPr>
+          <a:r>
+            <a:rPr lang="en-GB" sz="4300" kern="1200" dirty="0" err="1"/>
+            <a:t>Snezka</a:t>
+          </a:r>
+          <a:r>
+            <a:rPr lang="en-GB" sz="4300" kern="1200" dirty="0"/>
+            <a:t> Release</a:t>
+          </a:r>
+          <a:br>
+            <a:rPr lang="en-GB" sz="4300" kern="1200" dirty="0"/>
+          </a:br>
+          <a:r>
+            <a:rPr lang="en-GB" sz="4300" kern="1200" dirty="0"/>
+            <a:t>January 2020</a:t>
+          </a:r>
+        </a:p>
+      </dsp:txBody>
+      <dsp:txXfrm>
+        <a:off x="5434" y="64105"/>
+        <a:ext cx="5298406" cy="1568760"/>
+      </dsp:txXfrm>
+    </dsp:sp>
+    <dsp:sp modelId="{A924A376-1AFF-B249-A073-BE4BC22C232A}">
+      <dsp:nvSpPr>
+        <dsp:cNvPr id="0" name=""/>
+        <dsp:cNvSpPr/>
+      </dsp:nvSpPr>
+      <dsp:spPr>
+        <a:xfrm>
+          <a:off x="5434" y="1632866"/>
+          <a:ext cx="5298406" cy="4913206"/>
+        </a:xfrm>
+        <a:prstGeom prst="rect">
+          <a:avLst/>
+        </a:prstGeom>
+        <a:solidFill>
+          <a:schemeClr val="accent1">
+            <a:alpha val="90000"/>
+            <a:tint val="40000"/>
+            <a:hueOff val="0"/>
+            <a:satOff val="0"/>
+            <a:lumOff val="0"/>
+            <a:alphaOff val="0"/>
+          </a:schemeClr>
+        </a:solidFill>
+        <a:ln w="12700" cap="flat" cmpd="sng" algn="ctr">
+          <a:solidFill>
+            <a:schemeClr val="accent1">
+              <a:alpha val="90000"/>
+              <a:tint val="40000"/>
+              <a:hueOff val="0"/>
+              <a:satOff val="0"/>
+              <a:lumOff val="0"/>
+              <a:alphaOff val="0"/>
+            </a:schemeClr>
+          </a:solidFill>
+          <a:prstDash val="solid"/>
+          <a:miter lim="800000"/>
+        </a:ln>
+        <a:effectLst/>
+      </dsp:spPr>
+      <dsp:style>
+        <a:lnRef idx="2">
+          <a:scrgbClr r="0" g="0" b="0"/>
+        </a:lnRef>
+        <a:fillRef idx="1">
+          <a:scrgbClr r="0" g="0" b="0"/>
+        </a:fillRef>
+        <a:effectRef idx="0">
+          <a:scrgbClr r="0" g="0" b="0"/>
+        </a:effectRef>
+        <a:fontRef idx="minor"/>
+      </dsp:style>
+      <dsp:txBody>
+        <a:bodyPr spcFirstLastPara="0" vert="horz" wrap="square" lIns="229362" tIns="229362" rIns="305816" bIns="344043" numCol="1" spcCol="1270" anchor="t" anchorCtr="0">
+          <a:noAutofit/>
+        </a:bodyPr>
+        <a:lstStyle/>
+        <a:p>
+          <a:pPr marL="285750" lvl="1" indent="-285750" algn="l" defTabSz="1911350">
+            <a:lnSpc>
+              <a:spcPct val="90000"/>
+            </a:lnSpc>
+            <a:spcBef>
+              <a:spcPct val="0"/>
+            </a:spcBef>
+            <a:spcAft>
+              <a:spcPct val="15000"/>
+            </a:spcAft>
+            <a:buChar char="•"/>
+          </a:pPr>
+          <a:r>
+            <a:rPr lang="en-GB" sz="4300" kern="1200" dirty="0"/>
+            <a:t>Table of Contents complete for all chapters</a:t>
+          </a:r>
+        </a:p>
+        <a:p>
+          <a:pPr marL="285750" lvl="1" indent="-285750" algn="l" defTabSz="1911350">
+            <a:lnSpc>
+              <a:spcPct val="90000"/>
+            </a:lnSpc>
+            <a:spcBef>
+              <a:spcPct val="0"/>
+            </a:spcBef>
+            <a:spcAft>
+              <a:spcPct val="15000"/>
+            </a:spcAft>
+            <a:buChar char="•"/>
+          </a:pPr>
+          <a:r>
+            <a:rPr lang="en-GB" sz="4300" kern="1200" dirty="0"/>
+            <a:t>Chapters 1,2,3,6 at “Lots of SME feedback” or better</a:t>
+          </a:r>
+        </a:p>
+      </dsp:txBody>
+      <dsp:txXfrm>
+        <a:off x="5434" y="1632866"/>
+        <a:ext cx="5298406" cy="4913206"/>
+      </dsp:txXfrm>
+    </dsp:sp>
+    <dsp:sp modelId="{73CC7069-E204-0A47-9A88-7F587A301723}">
+      <dsp:nvSpPr>
+        <dsp:cNvPr id="0" name=""/>
+        <dsp:cNvSpPr/>
+      </dsp:nvSpPr>
+      <dsp:spPr>
+        <a:xfrm>
+          <a:off x="6045617" y="64105"/>
+          <a:ext cx="5298406" cy="1568760"/>
+        </a:xfrm>
+        <a:prstGeom prst="rect">
+          <a:avLst/>
+        </a:prstGeom>
+        <a:solidFill>
+          <a:schemeClr val="accent1">
+            <a:hueOff val="0"/>
+            <a:satOff val="0"/>
+            <a:lumOff val="0"/>
+            <a:alphaOff val="0"/>
+          </a:schemeClr>
+        </a:solidFill>
+        <a:ln w="12700" cap="flat" cmpd="sng" algn="ctr">
+          <a:solidFill>
+            <a:schemeClr val="accent1">
+              <a:hueOff val="0"/>
+              <a:satOff val="0"/>
+              <a:lumOff val="0"/>
+              <a:alphaOff val="0"/>
+            </a:schemeClr>
+          </a:solidFill>
+          <a:prstDash val="solid"/>
+          <a:miter lim="800000"/>
+        </a:ln>
+        <a:effectLst/>
+      </dsp:spPr>
+      <dsp:style>
+        <a:lnRef idx="2">
+          <a:scrgbClr r="0" g="0" b="0"/>
+        </a:lnRef>
+        <a:fillRef idx="1">
+          <a:scrgbClr r="0" g="0" b="0"/>
+        </a:fillRef>
+        <a:effectRef idx="0">
+          <a:scrgbClr r="0" g="0" b="0"/>
+        </a:effectRef>
+        <a:fontRef idx="minor">
+          <a:schemeClr val="lt1"/>
+        </a:fontRef>
+      </dsp:style>
+      <dsp:txBody>
+        <a:bodyPr spcFirstLastPara="0" vert="horz" wrap="square" lIns="305816" tIns="174752" rIns="305816" bIns="174752" numCol="1" spcCol="1270" anchor="ctr" anchorCtr="0">
+          <a:noAutofit/>
+        </a:bodyPr>
+        <a:lstStyle/>
+        <a:p>
+          <a:pPr marL="0" lvl="0" indent="0" algn="ctr" defTabSz="1911350">
+            <a:lnSpc>
+              <a:spcPct val="90000"/>
+            </a:lnSpc>
+            <a:spcBef>
+              <a:spcPct val="0"/>
+            </a:spcBef>
+            <a:spcAft>
+              <a:spcPct val="35000"/>
+            </a:spcAft>
+            <a:buNone/>
+          </a:pPr>
+          <a:r>
+            <a:rPr lang="en-GB" sz="4300" kern="1200" dirty="0"/>
+            <a:t>TBC Release </a:t>
+          </a:r>
+          <a:br>
+            <a:rPr lang="en-GB" sz="4300" kern="1200" dirty="0"/>
+          </a:br>
+          <a:r>
+            <a:rPr lang="en-GB" sz="4300" kern="1200" dirty="0"/>
+            <a:t>April 2020</a:t>
+          </a:r>
+        </a:p>
+      </dsp:txBody>
+      <dsp:txXfrm>
+        <a:off x="6045617" y="64105"/>
+        <a:ext cx="5298406" cy="1568760"/>
+      </dsp:txXfrm>
+    </dsp:sp>
+    <dsp:sp modelId="{1707C938-BFB5-BC42-8771-DAEA58EA8DA8}">
+      <dsp:nvSpPr>
+        <dsp:cNvPr id="0" name=""/>
+        <dsp:cNvSpPr/>
+      </dsp:nvSpPr>
+      <dsp:spPr>
+        <a:xfrm>
+          <a:off x="6045617" y="1632866"/>
+          <a:ext cx="5298406" cy="4913206"/>
+        </a:xfrm>
+        <a:prstGeom prst="rect">
+          <a:avLst/>
+        </a:prstGeom>
+        <a:solidFill>
+          <a:schemeClr val="accent1">
+            <a:alpha val="90000"/>
+            <a:tint val="40000"/>
+            <a:hueOff val="0"/>
+            <a:satOff val="0"/>
+            <a:lumOff val="0"/>
+            <a:alphaOff val="0"/>
+          </a:schemeClr>
+        </a:solidFill>
+        <a:ln w="12700" cap="flat" cmpd="sng" algn="ctr">
+          <a:solidFill>
+            <a:schemeClr val="accent1">
+              <a:alpha val="90000"/>
+              <a:tint val="40000"/>
+              <a:hueOff val="0"/>
+              <a:satOff val="0"/>
+              <a:lumOff val="0"/>
+              <a:alphaOff val="0"/>
+            </a:schemeClr>
+          </a:solidFill>
+          <a:prstDash val="solid"/>
+          <a:miter lim="800000"/>
+        </a:ln>
+        <a:effectLst/>
+      </dsp:spPr>
+      <dsp:style>
+        <a:lnRef idx="2">
+          <a:scrgbClr r="0" g="0" b="0"/>
+        </a:lnRef>
+        <a:fillRef idx="1">
+          <a:scrgbClr r="0" g="0" b="0"/>
+        </a:fillRef>
+        <a:effectRef idx="0">
+          <a:scrgbClr r="0" g="0" b="0"/>
+        </a:effectRef>
+        <a:fontRef idx="minor"/>
+      </dsp:style>
+      <dsp:txBody>
+        <a:bodyPr spcFirstLastPara="0" vert="horz" wrap="square" lIns="229362" tIns="229362" rIns="305816" bIns="344043" numCol="1" spcCol="1270" anchor="t" anchorCtr="0">
+          <a:noAutofit/>
+        </a:bodyPr>
+        <a:lstStyle/>
+        <a:p>
+          <a:pPr marL="285750" lvl="1" indent="-285750" algn="l" defTabSz="1911350">
+            <a:lnSpc>
+              <a:spcPct val="90000"/>
+            </a:lnSpc>
+            <a:spcBef>
+              <a:spcPct val="0"/>
+            </a:spcBef>
+            <a:spcAft>
+              <a:spcPct val="15000"/>
+            </a:spcAft>
+            <a:buChar char="•"/>
+          </a:pPr>
+          <a:r>
+            <a:rPr lang="en-GB" sz="4300" kern="1200" dirty="0"/>
+            <a:t>Chapter 2 (Requirements) at “Complete”</a:t>
+          </a:r>
+        </a:p>
+        <a:p>
+          <a:pPr marL="285750" lvl="1" indent="-285750" algn="l" defTabSz="1911350">
+            <a:lnSpc>
+              <a:spcPct val="90000"/>
+            </a:lnSpc>
+            <a:spcBef>
+              <a:spcPct val="0"/>
+            </a:spcBef>
+            <a:spcAft>
+              <a:spcPct val="15000"/>
+            </a:spcAft>
+            <a:buChar char="•"/>
+          </a:pPr>
+          <a:r>
+            <a:rPr lang="en-GB" sz="4300" kern="1200" dirty="0"/>
+            <a:t>All other chapters at "Lots of SME feedback" or better</a:t>
+          </a:r>
+        </a:p>
+      </dsp:txBody>
+      <dsp:txXfrm>
+        <a:off x="6045617" y="1632866"/>
+        <a:ext cx="5298406" cy="4913206"/>
+      </dsp:txXfrm>
+    </dsp:sp>
+    <dsp:sp modelId="{60720EE3-9CC1-1242-B5CD-82C76E3DFCF1}">
+      <dsp:nvSpPr>
+        <dsp:cNvPr id="0" name=""/>
+        <dsp:cNvSpPr/>
+      </dsp:nvSpPr>
+      <dsp:spPr>
+        <a:xfrm>
+          <a:off x="12085801" y="64105"/>
+          <a:ext cx="5298406" cy="1568760"/>
+        </a:xfrm>
+        <a:prstGeom prst="rect">
+          <a:avLst/>
+        </a:prstGeom>
+        <a:solidFill>
+          <a:schemeClr val="accent1">
+            <a:hueOff val="0"/>
+            <a:satOff val="0"/>
+            <a:lumOff val="0"/>
+            <a:alphaOff val="0"/>
+          </a:schemeClr>
+        </a:solidFill>
+        <a:ln w="12700" cap="flat" cmpd="sng" algn="ctr">
+          <a:solidFill>
+            <a:schemeClr val="accent1">
+              <a:hueOff val="0"/>
+              <a:satOff val="0"/>
+              <a:lumOff val="0"/>
+              <a:alphaOff val="0"/>
+            </a:schemeClr>
+          </a:solidFill>
+          <a:prstDash val="solid"/>
+          <a:miter lim="800000"/>
+        </a:ln>
+        <a:effectLst/>
+      </dsp:spPr>
+      <dsp:style>
+        <a:lnRef idx="2">
+          <a:scrgbClr r="0" g="0" b="0"/>
+        </a:lnRef>
+        <a:fillRef idx="1">
+          <a:scrgbClr r="0" g="0" b="0"/>
+        </a:fillRef>
+        <a:effectRef idx="0">
+          <a:scrgbClr r="0" g="0" b="0"/>
+        </a:effectRef>
+        <a:fontRef idx="minor">
+          <a:schemeClr val="lt1"/>
+        </a:fontRef>
+      </dsp:style>
+      <dsp:txBody>
+        <a:bodyPr spcFirstLastPara="0" vert="horz" wrap="square" lIns="305816" tIns="174752" rIns="305816" bIns="174752" numCol="1" spcCol="1270" anchor="ctr" anchorCtr="0">
+          <a:noAutofit/>
+        </a:bodyPr>
+        <a:lstStyle/>
+        <a:p>
+          <a:pPr marL="0" lvl="0" indent="0" algn="ctr" defTabSz="1911350">
+            <a:lnSpc>
+              <a:spcPct val="90000"/>
+            </a:lnSpc>
+            <a:spcBef>
+              <a:spcPct val="0"/>
+            </a:spcBef>
+            <a:spcAft>
+              <a:spcPct val="35000"/>
+            </a:spcAft>
+            <a:buNone/>
+          </a:pPr>
+          <a:r>
+            <a:rPr lang="en-GB" sz="4300" kern="1200" dirty="0"/>
+            <a:t>TBC Release</a:t>
+          </a:r>
+          <a:br>
+            <a:rPr lang="en-GB" sz="4300" kern="1200" dirty="0"/>
+          </a:br>
+          <a:r>
+            <a:rPr lang="en-GB" sz="4300" kern="1200" dirty="0"/>
+            <a:t>July 2020</a:t>
+          </a:r>
+        </a:p>
+      </dsp:txBody>
+      <dsp:txXfrm>
+        <a:off x="12085801" y="64105"/>
+        <a:ext cx="5298406" cy="1568760"/>
+      </dsp:txXfrm>
+    </dsp:sp>
+    <dsp:sp modelId="{FB02936D-9138-E541-868F-238A92445032}">
+      <dsp:nvSpPr>
+        <dsp:cNvPr id="0" name=""/>
+        <dsp:cNvSpPr/>
+      </dsp:nvSpPr>
+      <dsp:spPr>
+        <a:xfrm>
+          <a:off x="12085801" y="1632866"/>
+          <a:ext cx="5298406" cy="4913206"/>
+        </a:xfrm>
+        <a:prstGeom prst="rect">
+          <a:avLst/>
+        </a:prstGeom>
+        <a:solidFill>
+          <a:schemeClr val="accent1">
+            <a:alpha val="90000"/>
+            <a:tint val="40000"/>
+            <a:hueOff val="0"/>
+            <a:satOff val="0"/>
+            <a:lumOff val="0"/>
+            <a:alphaOff val="0"/>
+          </a:schemeClr>
+        </a:solidFill>
+        <a:ln w="12700" cap="flat" cmpd="sng" algn="ctr">
+          <a:solidFill>
+            <a:schemeClr val="accent1">
+              <a:alpha val="90000"/>
+              <a:tint val="40000"/>
+              <a:hueOff val="0"/>
+              <a:satOff val="0"/>
+              <a:lumOff val="0"/>
+              <a:alphaOff val="0"/>
+            </a:schemeClr>
+          </a:solidFill>
+          <a:prstDash val="solid"/>
+          <a:miter lim="800000"/>
+        </a:ln>
+        <a:effectLst/>
+      </dsp:spPr>
+      <dsp:style>
+        <a:lnRef idx="2">
+          <a:scrgbClr r="0" g="0" b="0"/>
+        </a:lnRef>
+        <a:fillRef idx="1">
+          <a:scrgbClr r="0" g="0" b="0"/>
+        </a:fillRef>
+        <a:effectRef idx="0">
+          <a:scrgbClr r="0" g="0" b="0"/>
+        </a:effectRef>
+        <a:fontRef idx="minor"/>
+      </dsp:style>
+      <dsp:txBody>
+        <a:bodyPr spcFirstLastPara="0" vert="horz" wrap="square" lIns="229362" tIns="229362" rIns="305816" bIns="344043" numCol="1" spcCol="1270" anchor="t" anchorCtr="0">
+          <a:noAutofit/>
+        </a:bodyPr>
+        <a:lstStyle/>
+        <a:p>
+          <a:pPr marL="285750" lvl="1" indent="-285750" algn="l" defTabSz="1911350">
+            <a:lnSpc>
+              <a:spcPct val="90000"/>
+            </a:lnSpc>
+            <a:spcBef>
+              <a:spcPct val="0"/>
+            </a:spcBef>
+            <a:spcAft>
+              <a:spcPct val="15000"/>
+            </a:spcAft>
+            <a:buChar char="•"/>
+          </a:pPr>
+          <a:r>
+            <a:rPr lang="en-GB" sz="4300" kern="1200" dirty="0"/>
+            <a:t>Include VM orchestration for CNFs</a:t>
+          </a:r>
+        </a:p>
+        <a:p>
+          <a:pPr marL="285750" lvl="1" indent="-285750" algn="l" defTabSz="1911350">
+            <a:lnSpc>
+              <a:spcPct val="90000"/>
+            </a:lnSpc>
+            <a:spcBef>
+              <a:spcPct val="0"/>
+            </a:spcBef>
+            <a:spcAft>
+              <a:spcPct val="15000"/>
+            </a:spcAft>
+            <a:buChar char="•"/>
+          </a:pPr>
+          <a:r>
+            <a:rPr lang="en-GB" sz="4300" kern="1200" dirty="0"/>
+            <a:t>Mapping of specification to RM Infrastructure Profiles included</a:t>
+          </a:r>
+        </a:p>
+      </dsp:txBody>
+      <dsp:txXfrm>
+        <a:off x="12085801" y="1632866"/>
+        <a:ext cx="5298406" cy="4913206"/>
+      </dsp:txXfrm>
+    </dsp:sp>
+  </dsp:spTree>
+</dsp:drawing>
+</file>
+
+<file path=ppt/diagrams/layout1.xml><?xml version="1.0" encoding="utf-8"?>
+<dgm:layoutDef xmlns:dgm="http://schemas.openxmlformats.org/drawingml/2006/diagram" xmlns:a="http://schemas.openxmlformats.org/drawingml/2006/main" uniqueId="urn:microsoft.com/office/officeart/2005/8/layout/hList1">
+  <dgm:title val=""/>
+  <dgm:desc val=""/>
+  <dgm:catLst>
+    <dgm:cat type="list" pri="5000"/>
+    <dgm:cat type="convert" pri="5000"/>
+  </dgm:catLst>
+  <dgm:sampData>
+    <dgm:dataModel>
+      <dgm:ptLst>
+        <dgm:pt modelId="0" type="doc"/>
+        <dgm:pt modelId="1">
+          <dgm:prSet phldr="1"/>
+        </dgm:pt>
+        <dgm:pt modelId="11">
+          <dgm:prSet phldr="1"/>
+        </dgm:pt>
+        <dgm:pt modelId="12">
+          <dgm:prSet phldr="1"/>
+        </dgm:pt>
+        <dgm:pt modelId="2">
+          <dgm:prSet phldr="1"/>
+        </dgm:pt>
+        <dgm:pt modelId="21">
+          <dgm:prSet phldr="1"/>
+        </dgm:pt>
+        <dgm:pt modelId="22">
+          <dgm:prSet phldr="1"/>
+        </dgm:pt>
+        <dgm:pt modelId="3">
+          <dgm:prSet phldr="1"/>
+        </dgm:pt>
+        <dgm:pt modelId="31">
+          <dgm:prSet phldr="1"/>
+        </dgm:pt>
+        <dgm:pt modelId="32">
+          <dgm:prSet phldr="1"/>
+        </dgm:pt>
+      </dgm:ptLst>
+      <dgm:cxnLst>
+        <dgm:cxn modelId="4" srcId="0" destId="1" srcOrd="0" destOrd="0"/>
+        <dgm:cxn modelId="5" srcId="0" destId="2" srcOrd="1" destOrd="0"/>
+        <dgm:cxn modelId="6" srcId="0" destId="3" srcOrd="2" destOrd="0"/>
+        <dgm:cxn modelId="13" srcId="1" destId="11" srcOrd="0" destOrd="0"/>
+        <dgm:cxn modelId="14" srcId="1" destId="12" srcOrd="1" destOrd="0"/>
+        <dgm:cxn modelId="23" srcId="2" destId="21" srcOrd="0" destOrd="0"/>
+        <dgm:cxn modelId="24" srcId="2" destId="22" srcOrd="1" destOrd="0"/>
+        <dgm:cxn modelId="33" srcId="3" destId="31" srcOrd="0" destOrd="0"/>
+        <dgm:cxn modelId="34" srcId="3" destId="32" srcOrd="1" destOrd="0"/>
+      </dgm:cxnLst>
+      <dgm:bg/>
+      <dgm:whole/>
+    </dgm:dataModel>
+  </dgm:sampData>
+  <dgm:styleData>
+    <dgm:dataModel>
+      <dgm:ptLst>
+        <dgm:pt modelId="0" type="doc"/>
+        <dgm:pt modelId="1">
+          <dgm:prSet phldr="1"/>
+        </dgm:pt>
+        <dgm:pt modelId="2">
+          <dgm:prSet phldr="1"/>
+        </dgm:pt>
+      </dgm:ptLst>
+      <dgm:cxnLst>
+        <dgm:cxn modelId="3" srcId="0" destId="1" srcOrd="0" destOrd="0"/>
+        <dgm:cxn modelId="4" srcId="0" destId="2" srcOrd="1" destOrd="0"/>
+      </dgm:cxnLst>
+      <dgm:bg/>
+      <dgm:whole/>
+    </dgm:dataModel>
+  </dgm:styleData>
+  <dgm:clrData>
+    <dgm:dataModel>
+      <dgm:ptLst>
+        <dgm:pt modelId="0" type="doc"/>
+        <dgm:pt modelId="1">
+          <dgm:prSet phldr="1"/>
+        </dgm:pt>
+        <dgm:pt modelId="2">
+          <dgm:prSet phldr="1"/>
+        </dgm:pt>
+        <dgm:pt modelId="3">
+          <dgm:prSet phldr="1"/>
+        </dgm:pt>
+        <dgm:pt modelId="4">
+          <dgm:prSet phldr="1"/>
+        </dgm:pt>
+      </dgm:ptLst>
+      <dgm:cxnLst>
+        <dgm:cxn modelId="5" srcId="0" destId="1" srcOrd="0" destOrd="0"/>
+        <dgm:cxn modelId="6" srcId="0" destId="2" srcOrd="1" destOrd="0"/>
+        <dgm:cxn modelId="7" srcId="0" destId="3" srcOrd="2" destOrd="0"/>
+        <dgm:cxn modelId="8" srcId="0" destId="4" srcOrd="3" destOrd="0"/>
+      </dgm:cxnLst>
+      <dgm:bg/>
+      <dgm:whole/>
+    </dgm:dataModel>
+  </dgm:clrData>
+  <dgm:layoutNode name="Name0">
+    <dgm:varLst>
+      <dgm:dir/>
+      <dgm:animLvl val="lvl"/>
+      <dgm:resizeHandles val="exact"/>
+    </dgm:varLst>
+    <dgm:choose name="Name1">
+      <dgm:if name="Name2" func="var" arg="dir" op="equ" val="norm">
+        <dgm:alg type="lin"/>
+      </dgm:if>
+      <dgm:else name="Name3">
+        <dgm:alg type="lin">
+          <dgm:param type="linDir" val="fromR"/>
+        </dgm:alg>
+      </dgm:else>
+    </dgm:choose>
+    <dgm:shape xmlns:r="http://schemas.openxmlformats.org/officeDocument/2006/relationships" r:blip="">
+      <dgm:adjLst/>
+    </dgm:shape>
+    <dgm:presOf/>
+    <dgm:constrLst>
+      <dgm:constr type="h" for="ch" forName="composite" refType="h"/>
+      <dgm:constr type="w" for="ch" forName="composite" refType="w"/>
+      <dgm:constr type="w" for="des" forName="parTx"/>
+      <dgm:constr type="h" for="des" forName="parTx" op="equ"/>
+      <dgm:constr type="w" for="des" forName="desTx"/>
+      <dgm:constr type="h" for="des" forName="desTx" op="equ"/>
+      <dgm:constr type="primFontSz" for="des" forName="parTx" val="65"/>
+      <dgm:constr type="secFontSz" for="des" forName="desTx" refType="primFontSz" refFor="des" refForName="parTx" op="equ"/>
+      <dgm:constr type="h" for="des" forName="parTx" refType="primFontSz" refFor="des" refForName="parTx" fact="0.8"/>
+      <dgm:constr type="h" for="des" forName="desTx" refType="primFontSz" refFor="des" refForName="parTx" fact="1.22"/>
+      <dgm:constr type="w" for="ch" forName="space" refType="w" refFor="ch" refForName="composite" op="equ" fact="0.14"/>
+    </dgm:constrLst>
+    <dgm:ruleLst>
+      <dgm:rule type="w" for="ch" forName="composite" val="0" fact="NaN" max="NaN"/>
+      <dgm:rule type="primFontSz" for="des" forName="parTx" val="5" fact="NaN" max="NaN"/>
+    </dgm:ruleLst>
+    <dgm:forEach name="Name4" axis="ch" ptType="node">
+      <dgm:layoutNode name="composite">
+        <dgm:alg type="composite"/>
+        <dgm:shape xmlns:r="http://schemas.openxmlformats.org/officeDocument/2006/relationships" r:blip="">
+          <dgm:adjLst/>
+        </dgm:shape>
+        <dgm:presOf/>
+        <dgm:constrLst>
+          <dgm:constr type="l" for="ch" forName="parTx"/>
+          <dgm:constr type="w" for="ch" forName="parTx" refType="w"/>
+          <dgm:constr type="t" for="ch" forName="parTx"/>
+          <dgm:constr type="l" for="ch" forName="desTx"/>
+          <dgm:constr type="w" for="ch" forName="desTx" refType="w" refFor="ch" refForName="parTx"/>
+          <dgm:constr type="t" for="ch" forName="desTx" refType="h" refFor="ch" refForName="parTx"/>
+        </dgm:constrLst>
+        <dgm:ruleLst>
+          <dgm:rule type="h" val="INF" fact="NaN" max="NaN"/>
+        </dgm:ruleLst>
+        <dgm:layoutNode name="parTx" styleLbl="alignNode1">
+          <dgm:varLst>
+            <dgm:chMax val="0"/>
+            <dgm:chPref val="0"/>
+            <dgm:bulletEnabled val="1"/>
+          </dgm:varLst>
+          <dgm:alg type="tx"/>
+          <dgm:shape xmlns:r="http://schemas.openxmlformats.org/officeDocument/2006/relationships" type="rect" r:blip="">
+            <dgm:adjLst/>
+          </dgm:shape>
+          <dgm:presOf axis="self" ptType="node"/>
+          <dgm:constrLst>
+            <dgm:constr type="h" refType="w" op="lte" fact="0.4"/>
+            <dgm:constr type="h"/>
+            <dgm:constr type="tMarg" refType="primFontSz" fact="0.32"/>
+            <dgm:constr type="bMarg" refType="primFontSz" fact="0.32"/>
+          </dgm:constrLst>
+          <dgm:ruleLst>
+            <dgm:rule type="h" val="INF" fact="NaN" max="NaN"/>
+          </dgm:ruleLst>
+        </dgm:layoutNode>
+        <dgm:layoutNode name="desTx" styleLbl="alignAccFollowNode1">
+          <dgm:varLst>
+            <dgm:bulletEnabled val="1"/>
+          </dgm:varLst>
+          <dgm:alg type="tx">
+            <dgm:param type="stBulletLvl" val="1"/>
+          </dgm:alg>
+          <dgm:shape xmlns:r="http://schemas.openxmlformats.org/officeDocument/2006/relationships" type="rect" r:blip="">
+            <dgm:adjLst/>
+          </dgm:shape>
+          <dgm:presOf axis="des" ptType="node"/>
+          <dgm:constrLst>
+            <dgm:constr type="secFontSz" val="65"/>
+            <dgm:constr type="primFontSz" refType="secFontSz"/>
+            <dgm:constr type="h"/>
+            <dgm:constr type="lMarg" refType="primFontSz" fact="0.42"/>
+            <dgm:constr type="tMarg" refType="primFontSz" fact="0.42"/>
+            <dgm:constr type="bMarg" refType="primFontSz" fact="0.63"/>
+          </dgm:constrLst>
+          <dgm:ruleLst>
+            <dgm:rule type="h" val="INF" fact="NaN" max="NaN"/>
+          </dgm:ruleLst>
+        </dgm:layoutNode>
+      </dgm:layoutNode>
+      <dgm:forEach name="Name5" axis="followSib" ptType="sibTrans" cnt="1">
+        <dgm:layoutNode name="space">
+          <dgm:alg type="sp"/>
+          <dgm:shape xmlns:r="http://schemas.openxmlformats.org/officeDocument/2006/relationships" r:blip="">
+            <dgm:adjLst/>
+          </dgm:shape>
+          <dgm:presOf/>
+          <dgm:constrLst/>
+          <dgm:ruleLst/>
+        </dgm:layoutNode>
+      </dgm:forEach>
+    </dgm:forEach>
+  </dgm:layoutNode>
+</dgm:layoutDef>
+</file>
+
+<file path=ppt/diagrams/quickStyle1.xml><?xml version="1.0" encoding="utf-8"?>
+<dgm:styleDef xmlns:dgm="http://schemas.openxmlformats.org/drawingml/2006/diagram" xmlns:a="http://schemas.openxmlformats.org/drawingml/2006/main" uniqueId="urn:microsoft.com/office/officeart/2005/8/quickstyle/simple1">
+  <dgm:title val=""/>
+  <dgm:desc val=""/>
+  <dgm:catLst>
+    <dgm:cat type="simple" pri="10100"/>
+  </dgm:catLst>
+  <dgm:scene3d>
+    <a:camera prst="orthographicFront"/>
+    <a:lightRig rig="threePt" dir="t"/>
+  </dgm:scene3d>
+  <dgm:styleLbl name="node0">
+    <dgm:scene3d>
+      <a:camera prst="orthographicFront"/>
+      <a:lightRig rig="threePt" dir="t"/>
+    </dgm:scene3d>
+    <dgm:sp3d/>
+    <dgm:txPr/>
+    <dgm:style>
+      <a:lnRef idx="2">
+        <a:scrgbClr r="0" g="0" b="0"/>
+      </a:lnRef>
+      <a:fillRef idx="1">
+        <a:scrgbClr r="0" g="0" b="0"/>
+      </a:fillRef>
+      <a:effectRef idx="0">
+        <a:scrgbClr r="0" g="0" b="0"/>
+      </a:effectRef>
+      <a:fontRef idx="minor">
+        <a:schemeClr val="lt1"/>
+      </a:fontRef>
+    </dgm:style>
+  </dgm:styleLbl>
+  <dgm:styleLbl name="lnNode1">
+    <dgm:scene3d>
+      <a:camera prst="orthographicFront"/>
+      <a:lightRig rig="threePt" dir="t"/>
+    </dgm:scene3d>
+    <dgm:sp3d/>
+    <dgm:txPr/>
+    <dgm:style>
+      <a:lnRef idx="2">
+        <a:scrgbClr r="0" g="0" b="0"/>
+      </a:lnRef>
+      <a:fillRef idx="1">
+        <a:scrgbClr r="0" g="0" b="0"/>
+      </a:fillRef>
+      <a:effectRef idx="0">
+        <a:scrgbClr r="0" g="0" b="0"/>
+      </a:effectRef>
+      <a:fontRef idx="minor">
+        <a:schemeClr val="lt1"/>
+      </a:fontRef>
+    </dgm:style>
+  </dgm:styleLbl>
+  <dgm:styleLbl name="vennNode1">
+    <dgm:scene3d>
+      <a:camera prst="orthographicFront"/>
+      <a:lightRig rig="threePt" dir="t"/>
+    </dgm:scene3d>
+    <dgm:sp3d/>
+    <dgm:txPr/>
+    <dgm:style>
+      <a:lnRef idx="2">
+        <a:scrgbClr r="0" g="0" b="0"/>
+      </a:lnRef>
+      <a:fillRef idx="1">
+        <a:scrgbClr r="0" g="0" b="0"/>
+      </a:fillRef>
+      <a:effectRef idx="0">
+        <a:scrgbClr r="0" g="0" b="0"/>
+      </a:effectRef>
+      <a:fontRef idx="minor">
+        <a:schemeClr val="tx1"/>
+      </a:fontRef>
+    </dgm:style>
+  </dgm:styleLbl>
+  <dgm:styleLbl name="alignNode1">
+    <dgm:scene3d>
+      <a:camera prst="orthographicFront"/>
+      <a:lightRig rig="threePt" dir="t"/>
+    </dgm:scene3d>
+    <dgm:sp3d/>
+    <dgm:txPr/>
+    <dgm:style>
+      <a:lnRef idx="2">
+        <a:scrgbClr r="0" g="0" b="0"/>
+      </a:lnRef>
+      <a:fillRef idx="1">
+        <a:scrgbClr r="0" g="0" b="0"/>
+      </a:fillRef>
+      <a:effectRef idx="0">
+        <a:scrgbClr r="0" g="0" b="0"/>
+      </a:effectRef>
+      <a:fontRef idx="minor">
+        <a:schemeClr val="lt1"/>
+      </a:fontRef>
+    </dgm:style>
+  </dgm:styleLbl>
+  <dgm:styleLbl name="node1">
+    <dgm:scene3d>
+      <a:camera prst="orthographicFront"/>
+      <a:lightRig rig="threePt" dir="t"/>
+    </dgm:scene3d>
+    <dgm:sp3d/>
+    <dgm:txPr/>
+    <dgm:style>
+      <a:lnRef idx="2">
+        <a:scrgbClr r="0" g="0" b="0"/>
+      </a:lnRef>
+      <a:fillRef idx="1">
+        <a:scrgbClr r="0" g="0" b="0"/>
+      </a:fillRef>
+      <a:effectRef idx="0">
+        <a:scrgbClr r="0" g="0" b="0"/>
+      </a:effectRef>
+      <a:fontRef idx="minor">
+        <a:schemeClr val="lt1"/>
+      </a:fontRef>
+    </dgm:style>
+  </dgm:styleLbl>
+  <dgm:styleLbl name="node2">
+    <dgm:scene3d>
+      <a:camera prst="orthographicFront"/>
+      <a:lightRig rig="threePt" dir="t"/>
+    </dgm:scene3d>
+    <dgm:sp3d/>
+    <dgm:txPr/>
+    <dgm:style>
+      <a:lnRef idx="2">
+        <a:scrgbClr r="0" g="0" b="0"/>
+      </a:lnRef>
+      <a:fillRef idx="1">
+        <a:scrgbClr r="0" g="0" b="0"/>
+      </a:fillRef>
+      <a:effectRef idx="0">
+        <a:scrgbClr r="0" g="0" b="0"/>
+      </a:effectRef>
+      <a:fontRef idx="minor">
+        <a:schemeClr val="lt1"/>
+      </a:fontRef>
+    </dgm:style>
+  </dgm:styleLbl>
+  <dgm:styleLbl name="node3">
+    <dgm:scene3d>
+      <a:camera prst="orthographicFront"/>
+      <a:lightRig rig="threePt" dir="t"/>
+    </dgm:scene3d>
+    <dgm:sp3d/>
+    <dgm:txPr/>
+    <dgm:style>
+      <a:lnRef idx="2">
+        <a:scrgbClr r="0" g="0" b="0"/>
+      </a:lnRef>
+      <a:fillRef idx="1">
+        <a:scrgbClr r="0" g="0" b="0"/>
+      </a:fillRef>
+      <a:effectRef idx="0">
+        <a:scrgbClr r="0" g="0" b="0"/>
+      </a:effectRef>
+      <a:fontRef idx="minor">
+        <a:schemeClr val="lt1"/>
+      </a:fontRef>
+    </dgm:style>
+  </dgm:styleLbl>
+  <dgm:styleLbl name="node4">
+    <dgm:scene3d>
+      <a:camera prst="orthographicFront"/>
+      <a:lightRig rig="threePt" dir="t"/>
+    </dgm:scene3d>
+    <dgm:sp3d/>
+    <dgm:txPr/>
+    <dgm:style>
+      <a:lnRef idx="2">
+        <a:scrgbClr r="0" g="0" b="0"/>
+      </a:lnRef>
+      <a:fillRef idx="1">
+        <a:scrgbClr r="0" g="0" b="0"/>
+      </a:fillRef>
+      <a:effectRef idx="0">
+        <a:scrgbClr r="0" g="0" b="0"/>
+      </a:effectRef>
+      <a:fontRef idx="minor">
+        <a:schemeClr val="lt1"/>
+      </a:fontRef>
+    </dgm:style>
+  </dgm:styleLbl>
+  <dgm:styleLbl name="fgImgPlace1">
+    <dgm:scene3d>
+      <a:camera prst="orthographicFront"/>
+      <a:lightRig rig="threePt" dir="t"/>
+    </dgm:scene3d>
+    <dgm:sp3d/>
+    <dgm:txPr/>
+    <dgm:style>
+      <a:lnRef idx="2">
+        <a:scrgbClr r="0" g="0" b="0"/>
+      </a:lnRef>
+      <a:fillRef idx="1">
+        <a:scrgbClr r="0" g="0" b="0"/>
+      </a:fillRef>
+      <a:effectRef idx="0">
+        <a:scrgbClr r="0" g="0" b="0"/>
+      </a:effectRef>
+      <a:fontRef idx="minor"/>
+    </dgm:style>
+  </dgm:styleLbl>
+  <dgm:styleLbl name="alignImgPlace1">
+    <dgm:scene3d>
+      <a:camera prst="orthographicFront"/>
+      <a:lightRig rig="threePt" dir="t"/>
+    </dgm:scene3d>
+    <dgm:sp3d/>
+    <dgm:txPr/>
+    <dgm:style>
+      <a:lnRef idx="2">
+        <a:scrgbClr r="0" g="0" b="0"/>
+      </a:lnRef>
+      <a:fillRef idx="1">
+        <a:scrgbClr r="0" g="0" b="0"/>
+      </a:fillRef>
+      <a:effectRef idx="0">
+        <a:scrgbClr r="0" g="0" b="0"/>
+      </a:effectRef>
+      <a:fontRef idx="minor"/>
+    </dgm:style>
+  </dgm:styleLbl>
+  <dgm:styleLbl name="bgImgPlace1">
+    <dgm:scene3d>
+      <a:camera prst="orthographicFront"/>
+      <a:lightRig rig="threePt" dir="t"/>
+    </dgm:scene3d>
+    <dgm:sp3d/>
+    <dgm:txPr/>
+    <dgm:style>
+      <a:lnRef idx="2">
+        <a:scrgbClr r="0" g="0" b="0"/>
+      </a:lnRef>
+      <a:fillRef idx="1">
+        <a:scrgbClr r="0" g="0" b="0"/>
+      </a:fillRef>
+      <a:effectRef idx="0">
+        <a:scrgbClr r="0" g="0" b="0"/>
+      </a:effectRef>
+      <a:fontRef idx="minor"/>
+    </dgm:style>
+  </dgm:styleLbl>
+  <dgm:styleLbl name="sibTrans2D1">
+    <dgm:scene3d>
+      <a:camera prst="orthographicFront"/>
+      <a:lightRig rig="threePt" dir="t"/>
+    </dgm:scene3d>
+    <dgm:sp3d/>
+    <dgm:txPr/>
+    <dgm:style>
+      <a:lnRef idx="0">
+        <a:scrgbClr r="0" g="0" b="0"/>
+      </a:lnRef>
+      <a:fillRef idx="1">
+        <a:scrgbClr r="0" g="0" b="0"/>
+      </a:fillRef>
+      <a:effectRef idx="0">
+        <a:scrgbClr r="0" g="0" b="0"/>
+      </a:effectRef>
+      <a:fontRef idx="minor">
+        <a:schemeClr val="lt1"/>
+      </a:fontRef>
+    </dgm:style>
+  </dgm:styleLbl>
+  <dgm:styleLbl name="fgSibTrans2D1">
+    <dgm:scene3d>
+      <a:camera prst="orthographicFront"/>
+      <a:lightRig rig="threePt" dir="t"/>
+    </dgm:scene3d>
+    <dgm:sp3d/>
+    <dgm:txPr/>
+    <dgm:style>
+      <a:lnRef idx="0">
+        <a:scrgbClr r="0" g="0" b="0"/>
+      </a:lnRef>
+      <a:fillRef idx="1">
+        <a:scrgbClr r="0" g="0" b="0"/>
+      </a:fillRef>
+      <a:effectRef idx="0">
+        <a:scrgbClr r="0" g="0" b="0"/>
+      </a:effectRef>
+      <a:fontRef idx="minor">
+        <a:schemeClr val="lt1"/>
+      </a:fontRef>
+    </dgm:style>
+  </dgm:styleLbl>
+  <dgm:styleLbl name="bgSibTrans2D1">
+    <dgm:scene3d>
+      <a:camera prst="orthographicFront"/>
+      <a:lightRig rig="threePt" dir="t"/>
+    </dgm:scene3d>
+    <dgm:sp3d/>
+    <dgm:txPr/>
+    <dgm:style>
+      <a:lnRef idx="0">
+        <a:scrgbClr r="0" g="0" b="0"/>
+      </a:lnRef>
+      <a:fillRef idx="1">
+        <a:scrgbClr r="0" g="0" b="0"/>
+      </a:fillRef>
+      <a:effectRef idx="0">
+        <a:scrgbClr r="0" g="0" b="0"/>
+      </a:effectRef>
+      <a:fontRef idx="minor">
+        <a:schemeClr val="lt1"/>
+      </a:fontRef>
+    </dgm:style>
+  </dgm:styleLbl>
+  <dgm:styleLbl name="sibTrans1D1">
+    <dgm:scene3d>
+      <a:camera prst="orthographicFront"/>
+      <a:lightRig rig="threePt" dir="t"/>
+    </dgm:scene3d>
+    <dgm:sp3d/>
+    <dgm:txPr/>
+    <dgm:style>
+      <a:lnRef idx="1">
+        <a:scrgbClr r="0" g="0" b="0"/>
+      </a:lnRef>
+      <a:fillRef idx="0">
+        <a:scrgbClr r="0" g="0" b="0"/>
+      </a:fillRef>
+      <a:effectRef idx="0">
+        <a:scrgbClr r="0" g="0" b="0"/>
+      </a:effectRef>
+      <a:fontRef idx="minor"/>
+    </dgm:style>
+  </dgm:styleLbl>
+  <dgm:styleLbl name="callout">
+    <dgm:scene3d>
+      <a:camera prst="orthographicFront"/>
+      <a:lightRig rig="threePt" dir="t"/>
+    </dgm:scene3d>
+    <dgm:sp3d/>
+    <dgm:txPr/>
+    <dgm:style>
+      <a:lnRef idx="2">
+        <a:scrgbClr r="0" g="0" b="0"/>
+      </a:lnRef>
+      <a:fillRef idx="1">
+        <a:scrgbClr r="0" g="0" b="0"/>
+      </a:fillRef>
+      <a:effectRef idx="0">
+        <a:scrgbClr r="0" g="0" b="0"/>
+      </a:effectRef>
+      <a:fontRef idx="minor"/>
+    </dgm:style>
+  </dgm:styleLbl>
+  <dgm:styleLbl name="asst0">
+    <dgm:scene3d>
+      <a:camera prst="orthographicFront"/>
+      <a:lightRig rig="threePt" dir="t"/>
+    </dgm:scene3d>
+    <dgm:sp3d/>
+    <dgm:txPr/>
+    <dgm:style>
+      <a:lnRef idx="2">
+        <a:scrgbClr r="0" g="0" b="0"/>
+      </a:lnRef>
+      <a:fillRef idx="1">
+        <a:scrgbClr r="0" g="0" b="0"/>
+      </a:fillRef>
+      <a:effectRef idx="0">
+        <a:scrgbClr r="0" g="0" b="0"/>
+      </a:effectRef>
+      <a:fontRef idx="minor">
+        <a:schemeClr val="lt1"/>
+      </a:fontRef>
+    </dgm:style>
+  </dgm:styleLbl>
+  <dgm:styleLbl name="asst1">
+    <dgm:scene3d>
+      <a:camera prst="orthographicFront"/>
+      <a:lightRig rig="threePt" dir="t"/>
+    </dgm:scene3d>
+    <dgm:sp3d/>
+    <dgm:txPr/>
+    <dgm:style>
+      <a:lnRef idx="2">
+        <a:scrgbClr r="0" g="0" b="0"/>
+      </a:lnRef>
+      <a:fillRef idx="1">
+        <a:scrgbClr r="0" g="0" b="0"/>
+      </a:fillRef>
+      <a:effectRef idx="0">
+        <a:scrgbClr r="0" g="0" b="0"/>
+      </a:effectRef>
+      <a:fontRef idx="minor">
+        <a:schemeClr val="lt1"/>
+      </a:fontRef>
+    </dgm:style>
+  </dgm:styleLbl>
+  <dgm:styleLbl name="asst2">
+    <dgm:scene3d>
+      <a:camera prst="orthographicFront"/>
+      <a:lightRig rig="threePt" dir="t"/>
+    </dgm:scene3d>
+    <dgm:sp3d/>
+    <dgm:txPr/>
+    <dgm:style>
+      <a:lnRef idx="2">
+        <a:scrgbClr r="0" g="0" b="0"/>
+      </a:lnRef>
+      <a:fillRef idx="1">
+        <a:scrgbClr r="0" g="0" b="0"/>
+      </a:fillRef>
+      <a:effectRef idx="0">
+        <a:scrgbClr r="0" g="0" b="0"/>
+      </a:effectRef>
+      <a:fontRef idx="minor">
+        <a:schemeClr val="lt1"/>
+      </a:fontRef>
+    </dgm:style>
+  </dgm:styleLbl>
+  <dgm:styleLbl name="asst3">
+    <dgm:scene3d>
+      <a:camera prst="orthographicFront"/>
+      <a:lightRig rig="threePt" dir="t"/>
+    </dgm:scene3d>
+    <dgm:sp3d/>
+    <dgm:txPr/>
+    <dgm:style>
+      <a:lnRef idx="2">
+        <a:scrgbClr r="0" g="0" b="0"/>
+      </a:lnRef>
+      <a:fillRef idx="1">
+        <a:scrgbClr r="0" g="0" b="0"/>
+      </a:fillRef>
+      <a:effectRef idx="0">
+        <a:scrgbClr r="0" g="0" b="0"/>
+      </a:effectRef>
+      <a:fontRef idx="minor">
+        <a:schemeClr val="lt1"/>
+      </a:fontRef>
+    </dgm:style>
+  </dgm:styleLbl>
+  <dgm:styleLbl name="asst4">
+    <dgm:scene3d>
+      <a:camera prst="orthographicFront"/>
+      <a:lightRig rig="threePt" dir="t"/>
+    </dgm:scene3d>
+    <dgm:sp3d/>
+    <dgm:txPr/>
+    <dgm:style>
+      <a:lnRef idx="2">
+        <a:scrgbClr r="0" g="0" b="0"/>
+      </a:lnRef>
+      <a:fillRef idx="1">
+        <a:scrgbClr r="0" g="0" b="0"/>
+      </a:fillRef>
+      <a:effectRef idx="0">
+        <a:scrgbClr r="0" g="0" b="0"/>
+      </a:effectRef>
+      <a:fontRef idx="minor">
+        <a:schemeClr val="lt1"/>
+      </a:fontRef>
+    </dgm:style>
+  </dgm:styleLbl>
+  <dgm:styleLbl name="parChTrans2D1">
+    <dgm:scene3d>
+      <a:camera prst="orthographicFront"/>
+      <a:lightRig rig="threePt" dir="t"/>
+    </dgm:scene3d>
+    <dgm:sp3d/>
+    <dgm:txPr/>
+    <dgm:style>
+      <a:lnRef idx="2">
+        <a:scrgbClr r="0" g="0" b="0"/>
+      </a:lnRef>
+      <a:fillRef idx="1">
+        <a:scrgbClr r="0" g="0" b="0"/>
+      </a:fillRef>
+      <a:effectRef idx="0">
+        <a:scrgbClr r="0" g="0" b="0"/>
+      </a:effectRef>
+      <a:fontRef idx="minor">
+        <a:schemeClr val="lt1"/>
+      </a:fontRef>
+    </dgm:style>
+  </dgm:styleLbl>
+  <dgm:styleLbl name="parChTrans2D2">
+    <dgm:scene3d>
+      <a:camera prst="orthographicFront"/>
+      <a:lightRig rig="threePt" dir="t"/>
+    </dgm:scene3d>
+    <dgm:sp3d/>
+    <dgm:txPr/>
+    <dgm:style>
+      <a:lnRef idx="2">
+        <a:scrgbClr r="0" g="0" b="0"/>
+      </a:lnRef>
+      <a:fillRef idx="1">
+        <a:scrgbClr r="0" g="0" b="0"/>
+      </a:fillRef>
+      <a:effectRef idx="0">
+        <a:scrgbClr r="0" g="0" b="0"/>
+      </a:effectRef>
+      <a:fontRef idx="minor">
+        <a:schemeClr val="lt1"/>
+      </a:fontRef>
+    </dgm:style>
+  </dgm:styleLbl>
+  <dgm:styleLbl name="parChTrans2D3">
+    <dgm:scene3d>
+      <a:camera prst="orthographicFront"/>
+      <a:lightRig rig="threePt" dir="t"/>
+    </dgm:scene3d>
+    <dgm:sp3d/>
+    <dgm:txPr/>
+    <dgm:style>
+      <a:lnRef idx="2">
+        <a:scrgbClr r="0" g="0" b="0"/>
+      </a:lnRef>
+      <a:fillRef idx="1">
+        <a:scrgbClr r="0" g="0" b="0"/>
+      </a:fillRef>
+      <a:effectRef idx="0">
+        <a:scrgbClr r="0" g="0" b="0"/>
+      </a:effectRef>
+      <a:fontRef idx="minor">
+        <a:schemeClr val="lt1"/>
+      </a:fontRef>
+    </dgm:style>
+  </dgm:styleLbl>
+  <dgm:styleLbl name="parChTrans2D4">
+    <dgm:scene3d>
+      <a:camera prst="orthographicFront"/>
+      <a:lightRig rig="threePt" dir="t"/>
+    </dgm:scene3d>
+    <dgm:sp3d/>
+    <dgm:txPr/>
+    <dgm:style>
+      <a:lnRef idx="2">
+        <a:scrgbClr r="0" g="0" b="0"/>
+      </a:lnRef>
+      <a:fillRef idx="1">
+        <a:scrgbClr r="0" g="0" b="0"/>
+      </a:fillRef>
+      <a:effectRef idx="0">
+        <a:scrgbClr r="0" g="0" b="0"/>
+      </a:effectRef>
+      <a:fontRef idx="minor">
+        <a:schemeClr val="lt1"/>
+      </a:fontRef>
+    </dgm:style>
+  </dgm:styleLbl>
+  <dgm:styleLbl name="parChTrans1D1">
+    <dgm:scene3d>
+      <a:camera prst="orthographicFront"/>
+      <a:lightRig rig="threePt" dir="t"/>
+    </dgm:scene3d>
+    <dgm:sp3d/>
+    <dgm:txPr/>
+    <dgm:style>
+      <a:lnRef idx="2">
+        <a:scrgbClr r="0" g="0" b="0"/>
+      </a:lnRef>
+      <a:fillRef idx="0">
+        <a:scrgbClr r="0" g="0" b="0"/>
+      </a:fillRef>
+      <a:effectRef idx="0">
+        <a:scrgbClr r="0" g="0" b="0"/>
+      </a:effectRef>
+      <a:fontRef idx="minor"/>
+    </dgm:style>
+  </dgm:styleLbl>
+  <dgm:styleLbl name="parChTrans1D2">
+    <dgm:scene3d>
+      <a:camera prst="orthographicFront"/>
+      <a:lightRig rig="threePt" dir="t"/>
+    </dgm:scene3d>
+    <dgm:sp3d/>
+    <dgm:txPr/>
+    <dgm:style>
+      <a:lnRef idx="2">
+        <a:scrgbClr r="0" g="0" b="0"/>
+      </a:lnRef>
+      <a:fillRef idx="0">
+        <a:scrgbClr r="0" g="0" b="0"/>
+      </a:fillRef>
+      <a:effectRef idx="0">
+        <a:scrgbClr r="0" g="0" b="0"/>
+      </a:effectRef>
+      <a:fontRef idx="minor"/>
+    </dgm:style>
+  </dgm:styleLbl>
+  <dgm:styleLbl name="parChTrans1D3">
+    <dgm:scene3d>
+      <a:camera prst="orthographicFront"/>
+      <a:lightRig rig="threePt" dir="t"/>
+    </dgm:scene3d>
+    <dgm:sp3d/>
+    <dgm:txPr/>
+    <dgm:style>
+      <a:lnRef idx="2">
+        <a:scrgbClr r="0" g="0" b="0"/>
+      </a:lnRef>
+      <a:fillRef idx="0">
+        <a:scrgbClr r="0" g="0" b="0"/>
+      </a:fillRef>
+      <a:effectRef idx="0">
+        <a:scrgbClr r="0" g="0" b="0"/>
+      </a:effectRef>
+      <a:fontRef idx="minor"/>
+    </dgm:style>
+  </dgm:styleLbl>
+  <dgm:styleLbl name="parChTrans1D4">
+    <dgm:scene3d>
+      <a:camera prst="orthographicFront"/>
+      <a:lightRig rig="threePt" dir="t"/>
+    </dgm:scene3d>
+    <dgm:sp3d/>
+    <dgm:txPr/>
+    <dgm:style>
+      <a:lnRef idx="2">
+        <a:scrgbClr r="0" g="0" b="0"/>
+      </a:lnRef>
+      <a:fillRef idx="0">
+        <a:scrgbClr r="0" g="0" b="0"/>
+      </a:fillRef>
+      <a:effectRef idx="0">
+        <a:scrgbClr r="0" g="0" b="0"/>
+      </a:effectRef>
+      <a:fontRef idx="minor"/>
+    </dgm:style>
+  </dgm:styleLbl>
+  <dgm:styleLbl name="fgAcc1">
+    <dgm:scene3d>
+      <a:camera prst="orthographicFront"/>
+      <a:lightRig rig="threePt" dir="t"/>
+    </dgm:scene3d>
+    <dgm:sp3d/>
+    <dgm:txPr/>
+    <dgm:style>
+      <a:lnRef idx="2">
+        <a:scrgbClr r="0" g="0" b="0"/>
+      </a:lnRef>
+      <a:fillRef idx="1">
+        <a:scrgbClr r="0" g="0" b="0"/>
+      </a:fillRef>
+      <a:effectRef idx="0">
+        <a:scrgbClr r="0" g="0" b="0"/>
+      </a:effectRef>
+      <a:fontRef idx="minor"/>
+    </dgm:style>
+  </dgm:styleLbl>
+  <dgm:styleLbl name="conFgAcc1">
+    <dgm:scene3d>
+      <a:camera prst="orthographicFront"/>
+      <a:lightRig rig="threePt" dir="t"/>
+    </dgm:scene3d>
+    <dgm:sp3d/>
+    <dgm:txPr/>
+    <dgm:style>
+      <a:lnRef idx="2">
+        <a:scrgbClr r="0" g="0" b="0"/>
+      </a:lnRef>
+      <a:fillRef idx="1">
+        <a:scrgbClr r="0" g="0" b="0"/>
+      </a:fillRef>
+      <a:effectRef idx="0">
+        <a:scrgbClr r="0" g="0" b="0"/>
+      </a:effectRef>
+      <a:fontRef idx="minor"/>
+    </dgm:style>
+  </dgm:styleLbl>
+  <dgm:styleLbl name="alignAcc1">
+    <dgm:scene3d>
+      <a:camera prst="orthographicFront"/>
+      <a:lightRig rig="threePt" dir="t"/>
+    </dgm:scene3d>
+    <dgm:sp3d/>
+    <dgm:txPr/>
+    <dgm:style>
+      <a:lnRef idx="2">
+        <a:scrgbClr r="0" g="0" b="0"/>
+      </a:lnRef>
+      <a:fillRef idx="1">
+        <a:scrgbClr r="0" g="0" b="0"/>
+      </a:fillRef>
+      <a:effectRef idx="0">
+        <a:scrgbClr r="0" g="0" b="0"/>
+      </a:effectRef>
+      <a:fontRef idx="minor"/>
+    </dgm:style>
+  </dgm:styleLbl>
+  <dgm:styleLbl name="trAlignAcc1">
+    <dgm:scene3d>
+      <a:camera prst="orthographicFront"/>
+      <a:lightRig rig="threePt" dir="t"/>
+    </dgm:scene3d>
+    <dgm:sp3d/>
+    <dgm:txPr/>
+    <dgm:style>
+      <a:lnRef idx="1">
+        <a:scrgbClr r="0" g="0" b="0"/>
+      </a:lnRef>
+      <a:fillRef idx="1">
+        <a:scrgbClr r="0" g="0" b="0"/>
+      </a:fillRef>
+      <a:effectRef idx="0">
+        <a:scrgbClr r="0" g="0" b="0"/>
+      </a:effectRef>
+      <a:fontRef idx="minor"/>
+    </dgm:style>
+  </dgm:styleLbl>
+  <dgm:styleLbl name="bgAcc1">
+    <dgm:scene3d>
+      <a:camera prst="orthographicFront"/>
+      <a:lightRig rig="threePt" dir="t"/>
+    </dgm:scene3d>
+    <dgm:sp3d/>
+    <dgm:txPr/>
+    <dgm:style>
+      <a:lnRef idx="2">
+        <a:scrgbClr r="0" g="0" b="0"/>
+      </a:lnRef>
+      <a:fillRef idx="1">
+        <a:scrgbClr r="0" g="0" b="0"/>
+      </a:fillRef>
+      <a:effectRef idx="0">
+        <a:scrgbClr r="0" g="0" b="0"/>
+      </a:effectRef>
+      <a:fontRef idx="minor"/>
+    </dgm:style>
+  </dgm:styleLbl>
+  <dgm:styleLbl name="solidFgAcc1">
+    <dgm:scene3d>
+      <a:camera prst="orthographicFront"/>
+      <a:lightRig rig="threePt" dir="t"/>
+    </dgm:scene3d>
+    <dgm:sp3d/>
+    <dgm:txPr/>
+    <dgm:style>
+      <a:lnRef idx="2">
+        <a:scrgbClr r="0" g="0" b="0"/>
+      </a:lnRef>
+      <a:fillRef idx="1">
+        <a:scrgbClr r="0" g="0" b="0"/>
+      </a:fillRef>
+      <a:effectRef idx="0">
+        <a:scrgbClr r="0" g="0" b="0"/>
+      </a:effectRef>
+      <a:fontRef idx="minor"/>
+    </dgm:style>
+  </dgm:styleLbl>
+  <dgm:styleLbl name="solidAlignAcc1">
+    <dgm:scene3d>
+      <a:camera prst="orthographicFront"/>
+      <a:lightRig rig="threePt" dir="t"/>
+    </dgm:scene3d>
+    <dgm:sp3d/>
+    <dgm:txPr/>
+    <dgm:style>
+      <a:lnRef idx="2">
+        <a:scrgbClr r="0" g="0" b="0"/>
+      </a:lnRef>
+      <a:fillRef idx="1">
+        <a:scrgbClr r="0" g="0" b="0"/>
+      </a:fillRef>
+      <a:effectRef idx="0">
+        <a:scrgbClr r="0" g="0" b="0"/>
+      </a:effectRef>
+      <a:fontRef idx="minor"/>
+    </dgm:style>
+  </dgm:styleLbl>
+  <dgm:styleLbl name="solidBgAcc1">
+    <dgm:scene3d>
+      <a:camera prst="orthographicFront"/>
+      <a:lightRig rig="threePt" dir="t"/>
+    </dgm:scene3d>
+    <dgm:sp3d/>
+    <dgm:txPr/>
+    <dgm:style>
+      <a:lnRef idx="2">
+        <a:scrgbClr r="0" g="0" b="0"/>
+      </a:lnRef>
+      <a:fillRef idx="1">
+        <a:scrgbClr r="0" g="0" b="0"/>
+      </a:fillRef>
+      <a:effectRef idx="0">
+        <a:scrgbClr r="0" g="0" b="0"/>
+      </a:effectRef>
+      <a:fontRef idx="minor"/>
+    </dgm:style>
+  </dgm:styleLbl>
+  <dgm:styleLbl name="fgAccFollowNode1">
+    <dgm:scene3d>
+      <a:camera prst="orthographicFront"/>
+      <a:lightRig rig="threePt" dir="t"/>
+    </dgm:scene3d>
+    <dgm:sp3d/>
+    <dgm:txPr/>
+    <dgm:style>
+      <a:lnRef idx="2">
+        <a:scrgbClr r="0" g="0" b="0"/>
+      </a:lnRef>
+      <a:fillRef idx="1">
+        <a:scrgbClr r="0" g="0" b="0"/>
+      </a:fillRef>
+      <a:effectRef idx="0">
+        <a:scrgbClr r="0" g="0" b="0"/>
+      </a:effectRef>
+      <a:fontRef idx="minor"/>
+    </dgm:style>
+  </dgm:styleLbl>
+  <dgm:styleLbl name="alignAccFollowNode1">
+    <dgm:scene3d>
+      <a:camera prst="orthographicFront"/>
+      <a:lightRig rig="threePt" dir="t"/>
+    </dgm:scene3d>
+    <dgm:sp3d/>
+    <dgm:txPr/>
+    <dgm:style>
+      <a:lnRef idx="2">
+        <a:scrgbClr r="0" g="0" b="0"/>
+      </a:lnRef>
+      <a:fillRef idx="1">
+        <a:scrgbClr r="0" g="0" b="0"/>
+      </a:fillRef>
+      <a:effectRef idx="0">
+        <a:scrgbClr r="0" g="0" b="0"/>
+      </a:effectRef>
+      <a:fontRef idx="minor"/>
+    </dgm:style>
+  </dgm:styleLbl>
+  <dgm:styleLbl name="bgAccFollowNode1">
+    <dgm:scene3d>
+      <a:camera prst="orthographicFront"/>
+      <a:lightRig rig="threePt" dir="t"/>
+    </dgm:scene3d>
+    <dgm:sp3d/>
+    <dgm:txPr/>
+    <dgm:style>
+      <a:lnRef idx="2">
+        <a:scrgbClr r="0" g="0" b="0"/>
+      </a:lnRef>
+      <a:fillRef idx="1">
+        <a:scrgbClr r="0" g="0" b="0"/>
+      </a:fillRef>
+      <a:effectRef idx="0">
+        <a:scrgbClr r="0" g="0" b="0"/>
+      </a:effectRef>
+      <a:fontRef idx="minor"/>
+    </dgm:style>
+  </dgm:styleLbl>
+  <dgm:styleLbl name="fgAcc0">
+    <dgm:scene3d>
+      <a:camera prst="orthographicFront"/>
+      <a:lightRig rig="threePt" dir="t"/>
+    </dgm:scene3d>
+    <dgm:sp3d/>
+    <dgm:txPr/>
+    <dgm:style>
+      <a:lnRef idx="2">
+        <a:scrgbClr r="0" g="0" b="0"/>
+      </a:lnRef>
+      <a:fillRef idx="1">
+        <a:scrgbClr r="0" g="0" b="0"/>
+      </a:fillRef>
+      <a:effectRef idx="0">
+        <a:scrgbClr r="0" g="0" b="0"/>
+      </a:effectRef>
+      <a:fontRef idx="minor"/>
+    </dgm:style>
+  </dgm:styleLbl>
+  <dgm:styleLbl name="fgAcc2">
+    <dgm:scene3d>
+      <a:camera prst="orthographicFront"/>
+      <a:lightRig rig="threePt" dir="t"/>
+    </dgm:scene3d>
+    <dgm:sp3d/>
+    <dgm:txPr/>
+    <dgm:style>
+      <a:lnRef idx="2">
+        <a:scrgbClr r="0" g="0" b="0"/>
+      </a:lnRef>
+      <a:fillRef idx="1">
+        <a:scrgbClr r="0" g="0" b="0"/>
+      </a:fillRef>
+      <a:effectRef idx="0">
+        <a:scrgbClr r="0" g="0" b="0"/>
+      </a:effectRef>
+      <a:fontRef idx="minor"/>
+    </dgm:style>
+  </dgm:styleLbl>
+  <dgm:styleLbl name="fgAcc3">
+    <dgm:scene3d>
+      <a:camera prst="orthographicFront"/>
+      <a:lightRig rig="threePt" dir="t"/>
+    </dgm:scene3d>
+    <dgm:sp3d/>
+    <dgm:txPr/>
+    <dgm:style>
+      <a:lnRef idx="2">
+        <a:scrgbClr r="0" g="0" b="0"/>
+      </a:lnRef>
+      <a:fillRef idx="1">
+        <a:scrgbClr r="0" g="0" b="0"/>
+      </a:fillRef>
+      <a:effectRef idx="0">
+        <a:scrgbClr r="0" g="0" b="0"/>
+      </a:effectRef>
+      <a:fontRef idx="minor"/>
+    </dgm:style>
+  </dgm:styleLbl>
+  <dgm:styleLbl name="fgAcc4">
+    <dgm:scene3d>
+      <a:camera prst="orthographicFront"/>
+      <a:lightRig rig="threePt" dir="t"/>
+    </dgm:scene3d>
+    <dgm:sp3d/>
+    <dgm:txPr/>
+    <dgm:style>
+      <a:lnRef idx="2">
+        <a:scrgbClr r="0" g="0" b="0"/>
+      </a:lnRef>
+      <a:fillRef idx="1">
+        <a:scrgbClr r="0" g="0" b="0"/>
+      </a:fillRef>
+      <a:effectRef idx="0">
+        <a:scrgbClr r="0" g="0" b="0"/>
+      </a:effectRef>
+      <a:fontRef idx="minor"/>
+    </dgm:style>
+  </dgm:styleLbl>
+  <dgm:styleLbl name="bgShp">
+    <dgm:scene3d>
+      <a:camera prst="orthographicFront"/>
+      <a:lightRig rig="threePt" dir="t"/>
+    </dgm:scene3d>
+    <dgm:sp3d/>
+    <dgm:txPr/>
+    <dgm:style>
+      <a:lnRef idx="0">
+        <a:scrgbClr r="0" g="0" b="0"/>
+      </a:lnRef>
+      <a:fillRef idx="1">
+        <a:scrgbClr r="0" g="0" b="0"/>
+      </a:fillRef>
+      <a:effectRef idx="0">
+        <a:scrgbClr r="0" g="0" b="0"/>
+      </a:effectRef>
+      <a:fontRef idx="minor"/>
+    </dgm:style>
+  </dgm:styleLbl>
+  <dgm:styleLbl name="dkBgShp">
+    <dgm:scene3d>
+      <a:camera prst="orthographicFront"/>
+      <a:lightRig rig="threePt" dir="t"/>
+    </dgm:scene3d>
+    <dgm:sp3d/>
+    <dgm:txPr/>
+    <dgm:style>
+      <a:lnRef idx="0">
+        <a:scrgbClr r="0" g="0" b="0"/>
+      </a:lnRef>
+      <a:fillRef idx="1">
+        <a:scrgbClr r="0" g="0" b="0"/>
+      </a:fillRef>
+      <a:effectRef idx="0">
+        <a:scrgbClr r="0" g="0" b="0"/>
+      </a:effectRef>
+      <a:fontRef idx="minor"/>
+    </dgm:style>
+  </dgm:styleLbl>
+  <dgm:styleLbl name="trBgShp">
+    <dgm:scene3d>
+      <a:camera prst="orthographicFront"/>
+      <a:lightRig rig="threePt" dir="t"/>
+    </dgm:scene3d>
+    <dgm:sp3d/>
+    <dgm:txPr/>
+    <dgm:style>
+      <a:lnRef idx="0">
+        <a:scrgbClr r="0" g="0" b="0"/>
+      </a:lnRef>
+      <a:fillRef idx="1">
+        <a:scrgbClr r="0" g="0" b="0"/>
+      </a:fillRef>
+      <a:effectRef idx="0">
+        <a:scrgbClr r="0" g="0" b="0"/>
+      </a:effectRef>
+      <a:fontRef idx="minor"/>
+    </dgm:style>
+  </dgm:styleLbl>
+  <dgm:styleLbl name="fgShp">
+    <dgm:scene3d>
+      <a:camera prst="orthographicFront"/>
+      <a:lightRig rig="threePt" dir="t"/>
+    </dgm:scene3d>
+    <dgm:sp3d/>
+    <dgm:txPr/>
+    <dgm:style>
+      <a:lnRef idx="2">
+        <a:scrgbClr r="0" g="0" b="0"/>
+      </a:lnRef>
+      <a:fillRef idx="1">
+        <a:scrgbClr r="0" g="0" b="0"/>
+      </a:fillRef>
+      <a:effectRef idx="0">
+        <a:scrgbClr r="0" g="0" b="0"/>
+      </a:effectRef>
+      <a:fontRef idx="minor"/>
+    </dgm:style>
+  </dgm:styleLbl>
+  <dgm:styleLbl name="revTx">
+    <dgm:scene3d>
+      <a:camera prst="orthographicFront"/>
+      <a:lightRig rig="threePt" dir="t"/>
+    </dgm:scene3d>
+    <dgm:sp3d/>
+    <dgm:txPr/>
+    <dgm:style>
+      <a:lnRef idx="0">
+        <a:scrgbClr r="0" g="0" b="0"/>
+      </a:lnRef>
+      <a:fillRef idx="0">
+        <a:scrgbClr r="0" g="0" b="0"/>
+      </a:fillRef>
+      <a:effectRef idx="0">
+        <a:scrgbClr r="0" g="0" b="0"/>
+      </a:effectRef>
+      <a:fontRef idx="minor"/>
+    </dgm:style>
+  </dgm:styleLbl>
+</dgm:styleDef>
 </file>
 
 <file path=ppt/slideLayouts/slideLayout1.xml><?xml version="1.0" encoding="utf-8"?>
@@ -246,7 +3299,7 @@
           <a:p>
             <a:fld id="{F9D3E6FF-AC24-BE43-AFD3-27417514DD0F}" type="datetimeFigureOut">
               <a:rPr lang="en-GB" smtClean="0"/>
-              <a:t>06/11/2019</a:t>
+              <a:t>09/01/2020</a:t>
             </a:fld>
             <a:endParaRPr lang="en-GB"/>
           </a:p>
@@ -416,7 +3469,7 @@
           <a:p>
             <a:fld id="{F9D3E6FF-AC24-BE43-AFD3-27417514DD0F}" type="datetimeFigureOut">
               <a:rPr lang="en-GB" smtClean="0"/>
-              <a:t>06/11/2019</a:t>
+              <a:t>09/01/2020</a:t>
             </a:fld>
             <a:endParaRPr lang="en-GB"/>
           </a:p>
@@ -596,7 +3649,7 @@
           <a:p>
             <a:fld id="{F9D3E6FF-AC24-BE43-AFD3-27417514DD0F}" type="datetimeFigureOut">
               <a:rPr lang="en-GB" smtClean="0"/>
-              <a:t>06/11/2019</a:t>
+              <a:t>09/01/2020</a:t>
             </a:fld>
             <a:endParaRPr lang="en-GB"/>
           </a:p>
@@ -766,7 +3819,7 @@
           <a:p>
             <a:fld id="{F9D3E6FF-AC24-BE43-AFD3-27417514DD0F}" type="datetimeFigureOut">
               <a:rPr lang="en-GB" smtClean="0"/>
-              <a:t>06/11/2019</a:t>
+              <a:t>09/01/2020</a:t>
             </a:fld>
             <a:endParaRPr lang="en-GB"/>
           </a:p>
@@ -1012,7 +4065,7 @@
           <a:p>
             <a:fld id="{F9D3E6FF-AC24-BE43-AFD3-27417514DD0F}" type="datetimeFigureOut">
               <a:rPr lang="en-GB" smtClean="0"/>
-              <a:t>06/11/2019</a:t>
+              <a:t>09/01/2020</a:t>
             </a:fld>
             <a:endParaRPr lang="en-GB"/>
           </a:p>
@@ -1244,7 +4297,7 @@
           <a:p>
             <a:fld id="{F9D3E6FF-AC24-BE43-AFD3-27417514DD0F}" type="datetimeFigureOut">
               <a:rPr lang="en-GB" smtClean="0"/>
-              <a:t>06/11/2019</a:t>
+              <a:t>09/01/2020</a:t>
             </a:fld>
             <a:endParaRPr lang="en-GB"/>
           </a:p>
@@ -1611,7 +4664,7 @@
           <a:p>
             <a:fld id="{F9D3E6FF-AC24-BE43-AFD3-27417514DD0F}" type="datetimeFigureOut">
               <a:rPr lang="en-GB" smtClean="0"/>
-              <a:t>06/11/2019</a:t>
+              <a:t>09/01/2020</a:t>
             </a:fld>
             <a:endParaRPr lang="en-GB"/>
           </a:p>
@@ -1729,7 +4782,7 @@
           <a:p>
             <a:fld id="{F9D3E6FF-AC24-BE43-AFD3-27417514DD0F}" type="datetimeFigureOut">
               <a:rPr lang="en-GB" smtClean="0"/>
-              <a:t>06/11/2019</a:t>
+              <a:t>09/01/2020</a:t>
             </a:fld>
             <a:endParaRPr lang="en-GB"/>
           </a:p>
@@ -1824,7 +4877,7 @@
           <a:p>
             <a:fld id="{F9D3E6FF-AC24-BE43-AFD3-27417514DD0F}" type="datetimeFigureOut">
               <a:rPr lang="en-GB" smtClean="0"/>
-              <a:t>06/11/2019</a:t>
+              <a:t>09/01/2020</a:t>
             </a:fld>
             <a:endParaRPr lang="en-GB"/>
           </a:p>
@@ -2101,7 +5154,7 @@
           <a:p>
             <a:fld id="{F9D3E6FF-AC24-BE43-AFD3-27417514DD0F}" type="datetimeFigureOut">
               <a:rPr lang="en-GB" smtClean="0"/>
-              <a:t>06/11/2019</a:t>
+              <a:t>09/01/2020</a:t>
             </a:fld>
             <a:endParaRPr lang="en-GB"/>
           </a:p>
@@ -2358,7 +5411,7 @@
           <a:p>
             <a:fld id="{F9D3E6FF-AC24-BE43-AFD3-27417514DD0F}" type="datetimeFigureOut">
               <a:rPr lang="en-GB" smtClean="0"/>
-              <a:t>06/11/2019</a:t>
+              <a:t>09/01/2020</a:t>
             </a:fld>
             <a:endParaRPr lang="en-GB"/>
           </a:p>
@@ -2571,7 +5624,7 @@
           <a:p>
             <a:fld id="{F9D3E6FF-AC24-BE43-AFD3-27417514DD0F}" type="datetimeFigureOut">
               <a:rPr lang="en-GB" smtClean="0"/>
-              <a:t>06/11/2019</a:t>
+              <a:t>09/01/2020</a:t>
             </a:fld>
             <a:endParaRPr lang="en-GB"/>
           </a:p>
@@ -21034,6 +24087,34 @@
           <a:chExt cx="0" cy="0"/>
         </a:xfrm>
       </p:grpSpPr>
+      <p:graphicFrame>
+        <p:nvGraphicFramePr>
+          <p:cNvPr id="2" name="Diagram 1">
+            <a:extLst>
+              <a:ext uri="{FF2B5EF4-FFF2-40B4-BE49-F238E27FC236}">
+                <a16:creationId xmlns:a16="http://schemas.microsoft.com/office/drawing/2014/main" id="{D0E8EB78-39BC-2244-A340-52E49B144D6D}"/>
+              </a:ext>
+            </a:extLst>
+          </p:cNvPr>
+          <p:cNvGraphicFramePr/>
+          <p:nvPr>
+            <p:extLst>
+              <p:ext uri="{D42A27DB-BD31-4B8C-83A1-F6EECF244321}">
+                <p14:modId xmlns:p14="http://schemas.microsoft.com/office/powerpoint/2010/main" val="2095778700"/>
+              </p:ext>
+            </p:extLst>
+          </p:nvPr>
+        </p:nvGraphicFramePr>
+        <p:xfrm>
+          <a:off x="513347" y="2598821"/>
+          <a:ext cx="17389642" cy="6610178"/>
+        </p:xfrm>
+        <a:graphic>
+          <a:graphicData uri="http://schemas.openxmlformats.org/drawingml/2006/diagram">
+            <dgm:relIds xmlns:dgm="http://schemas.openxmlformats.org/drawingml/2006/diagram" xmlns:r="http://schemas.openxmlformats.org/officeDocument/2006/relationships" r:dm="rId2" r:lo="rId3" r:qs="rId4" r:cs="rId5"/>
+          </a:graphicData>
+        </a:graphic>
+      </p:graphicFrame>
     </p:spTree>
     <p:extLst>
       <p:ext uri="{BB962C8B-B14F-4D97-AF65-F5344CB8AC3E}">

</xml_diff>

<commit_message>
[RA2 Ch1] Updated Figure 1-1 (#2425)
* Delete ch01_scope_k8s.png

* Add files via upload

* Delete ch01_scope_k8s.png

* Add files via upload

* Add files via upload

* Delete k8s-ref-arch-figures.pptx

* Add files via upload

* Delete ch01_scope_k8s.png

* Add files via upload
</commit_message>
<xml_diff>
--- a/doc/ref_arch/kubernetes/figures/k8s-ref-arch-figures.pptx
+++ b/doc/ref_arch/kubernetes/figures/k8s-ref-arch-figures.pptx
@@ -1322,8 +1322,8 @@
     <dgm:cxn modelId="{7D568038-554A-1942-9671-9E17579025B6}" type="presOf" srcId="{8DDEE7E0-DDB7-A24B-89B2-ADACF1815350}" destId="{FB02936D-9138-E541-868F-238A92445032}" srcOrd="0" destOrd="0" presId="urn:microsoft.com/office/officeart/2005/8/layout/hList1"/>
     <dgm:cxn modelId="{9C9CA33B-94FA-944E-8B82-BCE120CA75FC}" type="presOf" srcId="{A42F1D9D-E815-A840-B21A-C8A308A1B242}" destId="{1707C938-BFB5-BC42-8771-DAEA58EA8DA8}" srcOrd="0" destOrd="0" presId="urn:microsoft.com/office/officeart/2005/8/layout/hList1"/>
     <dgm:cxn modelId="{7380BC42-2D37-E747-B2C4-31F0A7DF3963}" srcId="{38B9CEC9-CE5B-5C4B-BB14-05AD30CEFB16}" destId="{8DDEE7E0-DDB7-A24B-89B2-ADACF1815350}" srcOrd="0" destOrd="0" parTransId="{4B5C4B37-5F9D-864F-A390-04545835A47D}" sibTransId="{4EF6A7EA-1061-834F-976A-042DFFF32111}"/>
+    <dgm:cxn modelId="{C05F9B6C-1B06-1D4C-929B-E1475DEFCA56}" srcId="{A35D7A88-9133-694F-B399-45807959694F}" destId="{F6071E1C-EDAC-9A40-920E-6396D1F3F8B6}" srcOrd="0" destOrd="0" parTransId="{B11FCE09-F120-8B49-AA5E-D514E812025E}" sibTransId="{14358919-DA4D-1D41-A664-4A9CD28B0FE9}"/>
     <dgm:cxn modelId="{73ED9D5A-F09B-9C4C-A07D-46CD25618CEC}" srcId="{E29E2A27-8533-E24F-8C31-5B9521B1439F}" destId="{502ABEF5-7782-A741-AC6F-58A53F775AD3}" srcOrd="1" destOrd="0" parTransId="{DA8B308B-E247-944E-A621-8150EA718556}" sibTransId="{0FEE11B4-2D90-4C42-98E1-D9EEEC68621C}"/>
-    <dgm:cxn modelId="{C05F9B6C-1B06-1D4C-929B-E1475DEFCA56}" srcId="{A35D7A88-9133-694F-B399-45807959694F}" destId="{F6071E1C-EDAC-9A40-920E-6396D1F3F8B6}" srcOrd="0" destOrd="0" parTransId="{B11FCE09-F120-8B49-AA5E-D514E812025E}" sibTransId="{14358919-DA4D-1D41-A664-4A9CD28B0FE9}"/>
     <dgm:cxn modelId="{990DE37D-6CEE-8349-BF60-7F61A7416952}" type="presOf" srcId="{32345713-D1E2-DD45-A7D5-1E0B73484EB3}" destId="{FB02936D-9138-E541-868F-238A92445032}" srcOrd="0" destOrd="1" presId="urn:microsoft.com/office/officeart/2005/8/layout/hList1"/>
     <dgm:cxn modelId="{8592FE85-E4E9-8B48-A407-6DADD09EA5B1}" srcId="{F6071E1C-EDAC-9A40-920E-6396D1F3F8B6}" destId="{77355CEE-F4FB-B145-BA7B-0969D50CE212}" srcOrd="0" destOrd="0" parTransId="{F2BDCC11-56D3-4442-A429-5D06472DF069}" sibTransId="{E6C3A3F3-286E-1A48-A36D-BD1179C07AFF}"/>
     <dgm:cxn modelId="{8C36C4AB-1953-C244-91AE-167DEB852B08}" type="presOf" srcId="{8E9C75FF-DB25-164E-A506-DC6D3BD6B9F9}" destId="{A924A376-1AFF-B249-A073-BE4BC22C232A}" srcOrd="0" destOrd="1" presId="urn:microsoft.com/office/officeart/2005/8/layout/hList1"/>
@@ -3300,7 +3300,7 @@
           <a:p>
             <a:fld id="{F9D3E6FF-AC24-BE43-AFD3-27417514DD0F}" type="datetimeFigureOut">
               <a:rPr lang="en-GB" smtClean="0"/>
-              <a:t>10/01/2020</a:t>
+              <a:t>13/05/2021</a:t>
             </a:fld>
             <a:endParaRPr lang="en-GB"/>
           </a:p>
@@ -3470,7 +3470,7 @@
           <a:p>
             <a:fld id="{F9D3E6FF-AC24-BE43-AFD3-27417514DD0F}" type="datetimeFigureOut">
               <a:rPr lang="en-GB" smtClean="0"/>
-              <a:t>10/01/2020</a:t>
+              <a:t>13/05/2021</a:t>
             </a:fld>
             <a:endParaRPr lang="en-GB"/>
           </a:p>
@@ -3650,7 +3650,7 @@
           <a:p>
             <a:fld id="{F9D3E6FF-AC24-BE43-AFD3-27417514DD0F}" type="datetimeFigureOut">
               <a:rPr lang="en-GB" smtClean="0"/>
-              <a:t>10/01/2020</a:t>
+              <a:t>13/05/2021</a:t>
             </a:fld>
             <a:endParaRPr lang="en-GB"/>
           </a:p>
@@ -3820,7 +3820,7 @@
           <a:p>
             <a:fld id="{F9D3E6FF-AC24-BE43-AFD3-27417514DD0F}" type="datetimeFigureOut">
               <a:rPr lang="en-GB" smtClean="0"/>
-              <a:t>10/01/2020</a:t>
+              <a:t>13/05/2021</a:t>
             </a:fld>
             <a:endParaRPr lang="en-GB"/>
           </a:p>
@@ -4066,7 +4066,7 @@
           <a:p>
             <a:fld id="{F9D3E6FF-AC24-BE43-AFD3-27417514DD0F}" type="datetimeFigureOut">
               <a:rPr lang="en-GB" smtClean="0"/>
-              <a:t>10/01/2020</a:t>
+              <a:t>13/05/2021</a:t>
             </a:fld>
             <a:endParaRPr lang="en-GB"/>
           </a:p>
@@ -4298,7 +4298,7 @@
           <a:p>
             <a:fld id="{F9D3E6FF-AC24-BE43-AFD3-27417514DD0F}" type="datetimeFigureOut">
               <a:rPr lang="en-GB" smtClean="0"/>
-              <a:t>10/01/2020</a:t>
+              <a:t>13/05/2021</a:t>
             </a:fld>
             <a:endParaRPr lang="en-GB"/>
           </a:p>
@@ -4665,7 +4665,7 @@
           <a:p>
             <a:fld id="{F9D3E6FF-AC24-BE43-AFD3-27417514DD0F}" type="datetimeFigureOut">
               <a:rPr lang="en-GB" smtClean="0"/>
-              <a:t>10/01/2020</a:t>
+              <a:t>13/05/2021</a:t>
             </a:fld>
             <a:endParaRPr lang="en-GB"/>
           </a:p>
@@ -4783,7 +4783,7 @@
           <a:p>
             <a:fld id="{F9D3E6FF-AC24-BE43-AFD3-27417514DD0F}" type="datetimeFigureOut">
               <a:rPr lang="en-GB" smtClean="0"/>
-              <a:t>10/01/2020</a:t>
+              <a:t>13/05/2021</a:t>
             </a:fld>
             <a:endParaRPr lang="en-GB"/>
           </a:p>
@@ -4878,7 +4878,7 @@
           <a:p>
             <a:fld id="{F9D3E6FF-AC24-BE43-AFD3-27417514DD0F}" type="datetimeFigureOut">
               <a:rPr lang="en-GB" smtClean="0"/>
-              <a:t>10/01/2020</a:t>
+              <a:t>13/05/2021</a:t>
             </a:fld>
             <a:endParaRPr lang="en-GB"/>
           </a:p>
@@ -5155,7 +5155,7 @@
           <a:p>
             <a:fld id="{F9D3E6FF-AC24-BE43-AFD3-27417514DD0F}" type="datetimeFigureOut">
               <a:rPr lang="en-GB" smtClean="0"/>
-              <a:t>10/01/2020</a:t>
+              <a:t>13/05/2021</a:t>
             </a:fld>
             <a:endParaRPr lang="en-GB"/>
           </a:p>
@@ -5412,7 +5412,7 @@
           <a:p>
             <a:fld id="{F9D3E6FF-AC24-BE43-AFD3-27417514DD0F}" type="datetimeFigureOut">
               <a:rPr lang="en-GB" smtClean="0"/>
-              <a:t>10/01/2020</a:t>
+              <a:t>13/05/2021</a:t>
             </a:fld>
             <a:endParaRPr lang="en-GB"/>
           </a:p>
@@ -5625,7 +5625,7 @@
           <a:p>
             <a:fld id="{F9D3E6FF-AC24-BE43-AFD3-27417514DD0F}" type="datetimeFigureOut">
               <a:rPr lang="en-GB" smtClean="0"/>
-              <a:t>10/01/2020</a:t>
+              <a:t>13/05/2021</a:t>
             </a:fld>
             <a:endParaRPr lang="en-GB"/>
           </a:p>
@@ -21698,14 +21698,14 @@
             <a:pPr algn="ctr"/>
             <a:r>
               <a:rPr lang="en-GB" dirty="0"/>
-              <a:t>Physical / virtual compute, storage and network infrastructure</a:t>
+              <a:t>Physical / virtual compute, storage</a:t>
             </a:r>
           </a:p>
           <a:p>
             <a:pPr algn="ctr"/>
             <a:r>
               <a:rPr lang="en-GB" dirty="0"/>
-              <a:t>(aligns with NFVI)</a:t>
+              <a:t>and network hardware resources</a:t>
             </a:r>
           </a:p>
         </p:txBody>
@@ -21762,7 +21762,7 @@
             <a:pPr algn="ctr"/>
             <a:r>
               <a:rPr lang="en-GB" dirty="0"/>
-              <a:t>Virtual or physical infrastructure management (largely aligns with VIM)</a:t>
+              <a:t>Virtual or physical hardware infrastructure manager</a:t>
             </a:r>
           </a:p>
         </p:txBody>
@@ -21819,7 +21819,14 @@
             <a:pPr algn="ctr"/>
             <a:r>
               <a:rPr lang="en-GB" dirty="0"/>
-              <a:t>Kubernetes Worker Node Machine (Virtual / Physical)</a:t>
+              <a:t>Kubernetes Worker Node</a:t>
+            </a:r>
+          </a:p>
+          <a:p>
+            <a:pPr algn="ctr"/>
+            <a:r>
+              <a:rPr lang="en-GB" dirty="0"/>
+              <a:t>(Virtual / Physical)</a:t>
             </a:r>
           </a:p>
         </p:txBody>
@@ -22063,7 +22070,14 @@
             <a:pPr algn="ctr"/>
             <a:r>
               <a:rPr lang="en-GB" dirty="0"/>
-              <a:t>Kubernetes Master Machine (Virtual / Physical)</a:t>
+              <a:t>Kubernetes Control Node</a:t>
+            </a:r>
+            <a:br>
+              <a:rPr lang="en-GB" dirty="0"/>
+            </a:br>
+            <a:r>
+              <a:rPr lang="en-GB" dirty="0"/>
+              <a:t>(Virtual / Physical)</a:t>
             </a:r>
           </a:p>
         </p:txBody>
@@ -22177,7 +22191,7 @@
             <a:pPr algn="ctr"/>
             <a:r>
               <a:rPr lang="en-GB" dirty="0"/>
-              <a:t>Kubernetes Master OS</a:t>
+              <a:t>Kubernetes Control Node OS</a:t>
             </a:r>
           </a:p>
         </p:txBody>
@@ -22234,7 +22248,7 @@
             <a:pPr algn="ctr"/>
             <a:r>
               <a:rPr lang="en-GB" sz="1400" dirty="0"/>
-              <a:t>Kubernetes Master Node Services (</a:t>
+              <a:t>Kubernetes Control Node Services (</a:t>
             </a:r>
             <a:r>
               <a:rPr lang="en-GB" sz="1400" dirty="0" err="1"/>
@@ -24190,14 +24204,14 @@
             <a:pPr algn="ctr"/>
             <a:r>
               <a:rPr lang="en-GB" dirty="0"/>
-              <a:t>Physical / virtual compute, storage and network infrastructure</a:t>
+              <a:t>Physical / virtual compute, storage</a:t>
             </a:r>
           </a:p>
           <a:p>
             <a:pPr algn="ctr"/>
             <a:r>
               <a:rPr lang="en-GB" dirty="0"/>
-              <a:t>(aligns with NFVI)</a:t>
+              <a:t>and network hardware resources</a:t>
             </a:r>
           </a:p>
         </p:txBody>
@@ -24254,7 +24268,7 @@
             <a:pPr algn="ctr"/>
             <a:r>
               <a:rPr lang="en-GB" dirty="0"/>
-              <a:t>Virtual or physical infrastructure management (largely aligns with VIM)</a:t>
+              <a:t>Virtual or physical hardware infrastructure manager</a:t>
             </a:r>
           </a:p>
         </p:txBody>
@@ -24311,7 +24325,14 @@
             <a:pPr algn="ctr"/>
             <a:r>
               <a:rPr lang="en-GB" dirty="0"/>
-              <a:t>Kubernetes Worker Node Machine (Virtual / Physical)</a:t>
+              <a:t>Kubernetes Worker Node</a:t>
+            </a:r>
+          </a:p>
+          <a:p>
+            <a:pPr algn="ctr"/>
+            <a:r>
+              <a:rPr lang="en-GB" dirty="0"/>
+              <a:t>(Virtual / Physical)</a:t>
             </a:r>
           </a:p>
         </p:txBody>
@@ -24555,7 +24576,14 @@
             <a:pPr algn="ctr"/>
             <a:r>
               <a:rPr lang="en-GB" dirty="0"/>
-              <a:t>Kubernetes Master Machine (Virtual / Physical)</a:t>
+              <a:t>Kubernetes Control Node</a:t>
+            </a:r>
+          </a:p>
+          <a:p>
+            <a:pPr algn="ctr"/>
+            <a:r>
+              <a:rPr lang="en-GB" dirty="0"/>
+              <a:t>(Virtual / Physical)</a:t>
             </a:r>
           </a:p>
         </p:txBody>
@@ -24669,7 +24697,7 @@
             <a:pPr algn="ctr"/>
             <a:r>
               <a:rPr lang="en-GB" dirty="0"/>
-              <a:t>Kubernetes Master OS</a:t>
+              <a:t>Kubernetes Control OS</a:t>
             </a:r>
           </a:p>
         </p:txBody>
@@ -24726,7 +24754,7 @@
             <a:pPr algn="ctr"/>
             <a:r>
               <a:rPr lang="en-GB" sz="1400" dirty="0"/>
-              <a:t>Kubernetes Master Node Services (</a:t>
+              <a:t>Kubernetes Control Node Services (</a:t>
             </a:r>
             <a:r>
               <a:rPr lang="en-GB" sz="1400" dirty="0" err="1"/>

</xml_diff>